<commit_message>
updated week 3 slides
</commit_message>
<xml_diff>
--- a/lis 4404 week 3.pptx
+++ b/lis 4404 week 3.pptx
@@ -1,11 +1,11 @@
 
 <file path=ppt/presentation.xml><?xml version="1.0" encoding="utf-8"?>
-<p:presentation xmlns:a="http://schemas.openxmlformats.org/drawingml/2006/main" xmlns:r="http://schemas.openxmlformats.org/officeDocument/2006/relationships" xmlns:p="http://schemas.openxmlformats.org/presentationml/2006/main" saveSubsetFonts="1">
+<p:presentation xmlns:a="http://schemas.openxmlformats.org/drawingml/2006/main" xmlns:r="http://schemas.openxmlformats.org/officeDocument/2006/relationships" xmlns:mc="http://schemas.openxmlformats.org/markup-compatibility/2006" xmlns:mv="urn:schemas-microsoft-com:mac:vml" xmlns:p="http://schemas.openxmlformats.org/presentationml/2006/main" mc:Ignorable="mv" mc:PreserveAttributes="mv:*" saveSubsetFonts="1">
   <p:sldMasterIdLst>
     <p:sldMasterId id="2147483648" r:id="rId1"/>
   </p:sldMasterIdLst>
   <p:notesMasterIdLst>
-    <p:notesMasterId r:id="rId34"/>
+    <p:notesMasterId r:id="rId35"/>
   </p:notesMasterIdLst>
   <p:sldIdLst>
     <p:sldId id="257" r:id="rId2"/>
@@ -40,6 +40,7 @@
     <p:sldId id="286" r:id="rId31"/>
     <p:sldId id="280" r:id="rId32"/>
     <p:sldId id="289" r:id="rId33"/>
+    <p:sldId id="290" r:id="rId34"/>
   </p:sldIdLst>
   <p:sldSz cx="9144000" cy="6858000" type="screen4x3"/>
   <p:notesSz cx="6858000" cy="9144000"/>
@@ -142,7 +143,7 @@
 </file>
 
 <file path=ppt/notesMasters/notesMaster1.xml><?xml version="1.0" encoding="utf-8"?>
-<p:notesMaster xmlns:a="http://schemas.openxmlformats.org/drawingml/2006/main" xmlns:r="http://schemas.openxmlformats.org/officeDocument/2006/relationships" xmlns:p="http://schemas.openxmlformats.org/presentationml/2006/main">
+<p:notesMaster xmlns:a="http://schemas.openxmlformats.org/drawingml/2006/main" xmlns:r="http://schemas.openxmlformats.org/officeDocument/2006/relationships" xmlns:mc="http://schemas.openxmlformats.org/markup-compatibility/2006" xmlns:mv="urn:schemas-microsoft-com:mac:vml" xmlns:p="http://schemas.openxmlformats.org/presentationml/2006/main" mc:Ignorable="mv" mc:PreserveAttributes="mv:*">
   <p:cSld>
     <p:bg>
       <p:bgRef idx="1001">
@@ -223,7 +224,8 @@
           <a:p>
             <a:fld id="{4008254D-23D1-4EFF-9B3B-00B37E935D92}" type="datetimeFigureOut">
               <a:rPr lang="en-US" smtClean="0"/>
-              <a:t>4/7/2015</a:t>
+              <a:pPr/>
+              <a:t>4/7/15</a:t>
             </a:fld>
             <a:endParaRPr lang="en-US"/>
           </a:p>
@@ -382,6 +384,7 @@
           <a:p>
             <a:fld id="{7EC0A236-1E09-43D8-9C98-C12E374E11B4}" type="slidenum">
               <a:rPr lang="en-US" smtClean="0"/>
+              <a:pPr/>
               <a:t>‹#›</a:t>
             </a:fld>
             <a:endParaRPr lang="en-US"/>
@@ -391,7 +394,7 @@
     </p:spTree>
     <p:extLst>
       <p:ext uri="{BB962C8B-B14F-4D97-AF65-F5344CB8AC3E}">
-        <p14:creationId xmlns:p14="http://schemas.microsoft.com/office/powerpoint/2010/main" val="2100028297"/>
+        <p14:creationId xmlns:p14="http://schemas.microsoft.com/office/powerpoint/2010/main" xmlns:p="http://schemas.openxmlformats.org/presentationml/2006/main" xmlns:r="http://schemas.openxmlformats.org/officeDocument/2006/relationships" xmlns:a="http://schemas.openxmlformats.org/drawingml/2006/main" xmlns="" val="2100028297"/>
       </p:ext>
     </p:extLst>
   </p:cSld>
@@ -492,7 +495,7 @@
 </file>
 
 <file path=ppt/notesSlides/notesSlide1.xml><?xml version="1.0" encoding="utf-8"?>
-<p:notes xmlns:a="http://schemas.openxmlformats.org/drawingml/2006/main" xmlns:r="http://schemas.openxmlformats.org/officeDocument/2006/relationships" xmlns:p="http://schemas.openxmlformats.org/presentationml/2006/main">
+<p:notes xmlns:a="http://schemas.openxmlformats.org/drawingml/2006/main" xmlns:r="http://schemas.openxmlformats.org/officeDocument/2006/relationships" xmlns:mc="http://schemas.openxmlformats.org/markup-compatibility/2006" xmlns:mv="urn:schemas-microsoft-com:mac:vml" xmlns:p="http://schemas.openxmlformats.org/presentationml/2006/main" mc:Ignorable="mv" mc:PreserveAttributes="mv:*">
   <p:cSld>
     <p:spTree>
       <p:nvGrpSpPr>
@@ -532,12 +535,16 @@
         </p:nvSpPr>
         <p:spPr/>
         <p:txBody>
-          <a:bodyPr/>
-          <a:lstStyle/>
-          <a:p>
-            <a:r>
-              <a:rPr lang="en-US" dirty="0" smtClean="0"/>
-              <a:t>http://www.loc.gov/standards/mods/mods-dcsimple.html</a:t>
+          <a:bodyPr>
+            <a:normAutofit/>
+          </a:bodyPr>
+          <a:lstStyle/>
+          <a:p>
+            <a:r>
+              <a:rPr lang="en-US" dirty="0" smtClean="0">
+                <a:hlinkClick r:id="rId3"/>
+              </a:rPr>
+              <a:t>http://dx.doi.org/10.1108/10650750410527322</a:t>
             </a:r>
             <a:endParaRPr lang="en-US" dirty="0"/>
           </a:p>
@@ -560,18 +567,14 @@
           <a:p>
             <a:fld id="{7EC0A236-1E09-43D8-9C98-C12E374E11B4}" type="slidenum">
               <a:rPr lang="en-US" smtClean="0"/>
-              <a:t>16</a:t>
+              <a:pPr/>
+              <a:t>7</a:t>
             </a:fld>
             <a:endParaRPr lang="en-US"/>
           </a:p>
         </p:txBody>
       </p:sp>
     </p:spTree>
-    <p:extLst>
-      <p:ext uri="{BB962C8B-B14F-4D97-AF65-F5344CB8AC3E}">
-        <p14:creationId xmlns:p14="http://schemas.microsoft.com/office/powerpoint/2010/main" val="2095854483"/>
-      </p:ext>
-    </p:extLst>
   </p:cSld>
   <p:clrMapOvr>
     <a:masterClrMapping/>
@@ -579,8 +582,8 @@
 </p:notes>
 </file>
 
-<file path=ppt/notesSlides/notesSlide2.xml><?xml version="1.0" encoding="utf-8"?>
-<p:notes xmlns:a="http://schemas.openxmlformats.org/drawingml/2006/main" xmlns:r="http://schemas.openxmlformats.org/officeDocument/2006/relationships" xmlns:p="http://schemas.openxmlformats.org/presentationml/2006/main">
+<file path=ppt/notesSlides/notesSlide10.xml><?xml version="1.0" encoding="utf-8"?>
+<p:notes xmlns:a="http://schemas.openxmlformats.org/drawingml/2006/main" xmlns:r="http://schemas.openxmlformats.org/officeDocument/2006/relationships" xmlns:mc="http://schemas.openxmlformats.org/markup-compatibility/2006" xmlns:mv="urn:schemas-microsoft-com:mac:vml" xmlns:p="http://schemas.openxmlformats.org/presentationml/2006/main" mc:Ignorable="mv" mc:PreserveAttributes="mv:*">
   <p:cSld>
     <p:spTree>
       <p:nvGrpSpPr>
@@ -620,12 +623,18 @@
         </p:nvSpPr>
         <p:spPr/>
         <p:txBody>
-          <a:bodyPr/>
-          <a:lstStyle/>
-          <a:p>
-            <a:r>
-              <a:rPr lang="en-US" dirty="0" smtClean="0"/>
-              <a:t>http://core.vraweb.org/examples/html/example045_full.html</a:t>
+          <a:bodyPr>
+            <a:normAutofit/>
+          </a:bodyPr>
+          <a:lstStyle/>
+          <a:p>
+            <a:r>
+              <a:rPr lang="en-US" dirty="0" smtClean="0"/>
+              <a:t>http://</a:t>
+            </a:r>
+            <a:r>
+              <a:rPr lang="en-US" dirty="0" err="1" smtClean="0"/>
+              <a:t>loc.gov/ead</a:t>
             </a:r>
             <a:endParaRPr lang="en-US" dirty="0"/>
           </a:p>
@@ -648,18 +657,14 @@
           <a:p>
             <a:fld id="{7EC0A236-1E09-43D8-9C98-C12E374E11B4}" type="slidenum">
               <a:rPr lang="en-US" smtClean="0"/>
-              <a:t>18</a:t>
+              <a:pPr/>
+              <a:t>21</a:t>
             </a:fld>
             <a:endParaRPr lang="en-US"/>
           </a:p>
         </p:txBody>
       </p:sp>
     </p:spTree>
-    <p:extLst>
-      <p:ext uri="{BB962C8B-B14F-4D97-AF65-F5344CB8AC3E}">
-        <p14:creationId xmlns:p14="http://schemas.microsoft.com/office/powerpoint/2010/main" val="3416184940"/>
-      </p:ext>
-    </p:extLst>
   </p:cSld>
   <p:clrMapOvr>
     <a:masterClrMapping/>
@@ -667,8 +672,8 @@
 </p:notes>
 </file>
 
-<file path=ppt/notesSlides/notesSlide3.xml><?xml version="1.0" encoding="utf-8"?>
-<p:notes xmlns:a="http://schemas.openxmlformats.org/drawingml/2006/main" xmlns:r="http://schemas.openxmlformats.org/officeDocument/2006/relationships" xmlns:p="http://schemas.openxmlformats.org/presentationml/2006/main">
+<file path=ppt/notesSlides/notesSlide11.xml><?xml version="1.0" encoding="utf-8"?>
+<p:notes xmlns:a="http://schemas.openxmlformats.org/drawingml/2006/main" xmlns:r="http://schemas.openxmlformats.org/officeDocument/2006/relationships" xmlns:mc="http://schemas.openxmlformats.org/markup-compatibility/2006" xmlns:mv="urn:schemas-microsoft-com:mac:vml" xmlns:p="http://schemas.openxmlformats.org/presentationml/2006/main" mc:Ignorable="mv" mc:PreserveAttributes="mv:*">
   <p:cSld>
     <p:spTree>
       <p:nvGrpSpPr>
@@ -708,12 +713,18 @@
         </p:nvSpPr>
         <p:spPr/>
         <p:txBody>
-          <a:bodyPr/>
-          <a:lstStyle/>
-          <a:p>
-            <a:r>
-              <a:rPr lang="en-US" dirty="0" smtClean="0"/>
-              <a:t>http://core.vraweb.org/examples/html/example045_full.html</a:t>
+          <a:bodyPr>
+            <a:normAutofit/>
+          </a:bodyPr>
+          <a:lstStyle/>
+          <a:p>
+            <a:r>
+              <a:rPr lang="en-US" dirty="0" err="1" smtClean="0"/>
+              <a:t>http://eac.staatsbibliothek-berlin.de</a:t>
+            </a:r>
+            <a:r>
+              <a:rPr lang="en-US" dirty="0" smtClean="0"/>
+              <a:t>/</a:t>
             </a:r>
             <a:endParaRPr lang="en-US" dirty="0"/>
           </a:p>
@@ -736,18 +747,14 @@
           <a:p>
             <a:fld id="{7EC0A236-1E09-43D8-9C98-C12E374E11B4}" type="slidenum">
               <a:rPr lang="en-US" smtClean="0"/>
-              <a:t>19</a:t>
+              <a:pPr/>
+              <a:t>23</a:t>
             </a:fld>
             <a:endParaRPr lang="en-US"/>
           </a:p>
         </p:txBody>
       </p:sp>
     </p:spTree>
-    <p:extLst>
-      <p:ext uri="{BB962C8B-B14F-4D97-AF65-F5344CB8AC3E}">
-        <p14:creationId xmlns:p14="http://schemas.microsoft.com/office/powerpoint/2010/main" val="2279837458"/>
-      </p:ext>
-    </p:extLst>
   </p:cSld>
   <p:clrMapOvr>
     <a:masterClrMapping/>
@@ -755,8 +762,8 @@
 </p:notes>
 </file>
 
-<file path=ppt/notesSlides/notesSlide4.xml><?xml version="1.0" encoding="utf-8"?>
-<p:notes xmlns:a="http://schemas.openxmlformats.org/drawingml/2006/main" xmlns:r="http://schemas.openxmlformats.org/officeDocument/2006/relationships" xmlns:p="http://schemas.openxmlformats.org/presentationml/2006/main">
+<file path=ppt/notesSlides/notesSlide12.xml><?xml version="1.0" encoding="utf-8"?>
+<p:notes xmlns:a="http://schemas.openxmlformats.org/drawingml/2006/main" xmlns:r="http://schemas.openxmlformats.org/officeDocument/2006/relationships" xmlns:mc="http://schemas.openxmlformats.org/markup-compatibility/2006" xmlns:mv="urn:schemas-microsoft-com:mac:vml" xmlns:p="http://schemas.openxmlformats.org/presentationml/2006/main" mc:Ignorable="mv" mc:PreserveAttributes="mv:*">
   <p:cSld>
     <p:spTree>
       <p:nvGrpSpPr>
@@ -796,12 +803,18 @@
         </p:nvSpPr>
         <p:spPr/>
         <p:txBody>
-          <a:bodyPr/>
-          <a:lstStyle/>
-          <a:p>
-            <a:r>
-              <a:rPr lang="en-US" dirty="0" smtClean="0"/>
-              <a:t>http://core.vraweb.org/examples/html/example045_full.html</a:t>
+          <a:bodyPr>
+            <a:normAutofit/>
+          </a:bodyPr>
+          <a:lstStyle/>
+          <a:p>
+            <a:r>
+              <a:rPr lang="en-US" dirty="0" smtClean="0"/>
+              <a:t>http://</a:t>
+            </a:r>
+            <a:r>
+              <a:rPr lang="en-US" dirty="0" err="1" smtClean="0"/>
+              <a:t>loc.gov/standards/premis</a:t>
             </a:r>
             <a:endParaRPr lang="en-US" dirty="0"/>
           </a:p>
@@ -824,18 +837,14 @@
           <a:p>
             <a:fld id="{7EC0A236-1E09-43D8-9C98-C12E374E11B4}" type="slidenum">
               <a:rPr lang="en-US" smtClean="0"/>
-              <a:t>20</a:t>
+              <a:pPr/>
+              <a:t>24</a:t>
             </a:fld>
             <a:endParaRPr lang="en-US"/>
           </a:p>
         </p:txBody>
       </p:sp>
     </p:spTree>
-    <p:extLst>
-      <p:ext uri="{BB962C8B-B14F-4D97-AF65-F5344CB8AC3E}">
-        <p14:creationId xmlns:p14="http://schemas.microsoft.com/office/powerpoint/2010/main" val="580125897"/>
-      </p:ext>
-    </p:extLst>
   </p:cSld>
   <p:clrMapOvr>
     <a:masterClrMapping/>
@@ -843,8 +852,8 @@
 </p:notes>
 </file>
 
-<file path=ppt/notesSlides/notesSlide5.xml><?xml version="1.0" encoding="utf-8"?>
-<p:notes xmlns:a="http://schemas.openxmlformats.org/drawingml/2006/main" xmlns:r="http://schemas.openxmlformats.org/officeDocument/2006/relationships" xmlns:p="http://schemas.openxmlformats.org/presentationml/2006/main">
+<file path=ppt/notesSlides/notesSlide13.xml><?xml version="1.0" encoding="utf-8"?>
+<p:notes xmlns:a="http://schemas.openxmlformats.org/drawingml/2006/main" xmlns:r="http://schemas.openxmlformats.org/officeDocument/2006/relationships" xmlns:mc="http://schemas.openxmlformats.org/markup-compatibility/2006" xmlns:mv="urn:schemas-microsoft-com:mac:vml" xmlns:p="http://schemas.openxmlformats.org/presentationml/2006/main" mc:Ignorable="mv" mc:PreserveAttributes="mv:*">
   <p:cSld>
     <p:spTree>
       <p:nvGrpSpPr>
@@ -884,12 +893,18 @@
         </p:nvSpPr>
         <p:spPr/>
         <p:txBody>
-          <a:bodyPr/>
-          <a:lstStyle/>
-          <a:p>
-            <a:r>
-              <a:rPr lang="en-US" dirty="0" smtClean="0"/>
-              <a:t>http://www.worldcat.org/title/kochbuch-selbsterprobter-rezepte/oclc/51688187</a:t>
+          <a:bodyPr>
+            <a:normAutofit/>
+          </a:bodyPr>
+          <a:lstStyle/>
+          <a:p>
+            <a:r>
+              <a:rPr lang="en-US" dirty="0" smtClean="0"/>
+              <a:t>http://</a:t>
+            </a:r>
+            <a:r>
+              <a:rPr lang="en-US" dirty="0" err="1" smtClean="0"/>
+              <a:t>loc.gov/standards/mets</a:t>
             </a:r>
             <a:endParaRPr lang="en-US" dirty="0"/>
           </a:p>
@@ -912,6 +927,422 @@
           <a:p>
             <a:fld id="{7EC0A236-1E09-43D8-9C98-C12E374E11B4}" type="slidenum">
               <a:rPr lang="en-US" smtClean="0"/>
+              <a:pPr/>
+              <a:t>25</a:t>
+            </a:fld>
+            <a:endParaRPr lang="en-US"/>
+          </a:p>
+        </p:txBody>
+      </p:sp>
+    </p:spTree>
+  </p:cSld>
+  <p:clrMapOvr>
+    <a:masterClrMapping/>
+  </p:clrMapOvr>
+</p:notes>
+</file>
+
+<file path=ppt/notesSlides/notesSlide14.xml><?xml version="1.0" encoding="utf-8"?>
+<p:notes xmlns:a="http://schemas.openxmlformats.org/drawingml/2006/main" xmlns:r="http://schemas.openxmlformats.org/officeDocument/2006/relationships" xmlns:mc="http://schemas.openxmlformats.org/markup-compatibility/2006" xmlns:mv="urn:schemas-microsoft-com:mac:vml" xmlns:p="http://schemas.openxmlformats.org/presentationml/2006/main" mc:Ignorable="mv" mc:PreserveAttributes="mv:*">
+  <p:cSld>
+    <p:spTree>
+      <p:nvGrpSpPr>
+        <p:cNvPr id="1" name=""/>
+        <p:cNvGrpSpPr/>
+        <p:nvPr/>
+      </p:nvGrpSpPr>
+      <p:grpSpPr>
+        <a:xfrm>
+          <a:off x="0" y="0"/>
+          <a:ext cx="0" cy="0"/>
+          <a:chOff x="0" y="0"/>
+          <a:chExt cx="0" cy="0"/>
+        </a:xfrm>
+      </p:grpSpPr>
+      <p:sp>
+        <p:nvSpPr>
+          <p:cNvPr id="2" name="Slide Image Placeholder 1"/>
+          <p:cNvSpPr>
+            <a:spLocks noGrp="1" noRot="1" noChangeAspect="1"/>
+          </p:cNvSpPr>
+          <p:nvPr>
+            <p:ph type="sldImg"/>
+          </p:nvPr>
+        </p:nvSpPr>
+        <p:spPr/>
+      </p:sp>
+      <p:sp>
+        <p:nvSpPr>
+          <p:cNvPr id="3" name="Notes Placeholder 2"/>
+          <p:cNvSpPr>
+            <a:spLocks noGrp="1"/>
+          </p:cNvSpPr>
+          <p:nvPr>
+            <p:ph type="body" idx="1"/>
+          </p:nvPr>
+        </p:nvSpPr>
+        <p:spPr/>
+        <p:txBody>
+          <a:bodyPr>
+            <a:normAutofit/>
+          </a:bodyPr>
+          <a:lstStyle/>
+          <a:p>
+            <a:r>
+              <a:rPr lang="en-US" dirty="0" err="1" smtClean="0"/>
+              <a:t>PBCore</a:t>
+            </a:r>
+            <a:r>
+              <a:rPr lang="en-US" dirty="0" smtClean="0"/>
+              <a:t>:</a:t>
+            </a:r>
+            <a:r>
+              <a:rPr lang="en-US" baseline="0" dirty="0" smtClean="0"/>
+              <a:t> http://</a:t>
+            </a:r>
+            <a:r>
+              <a:rPr lang="en-US" baseline="0" dirty="0" err="1" smtClean="0"/>
+              <a:t>pbcore.org</a:t>
+            </a:r>
+            <a:endParaRPr lang="en-US" baseline="0" dirty="0" smtClean="0"/>
+          </a:p>
+          <a:p>
+            <a:r>
+              <a:rPr lang="en-US" baseline="0" dirty="0" smtClean="0"/>
+              <a:t>FGDC: http://</a:t>
+            </a:r>
+            <a:r>
+              <a:rPr lang="en-US" baseline="0" dirty="0" err="1" smtClean="0"/>
+              <a:t>fgdc.gov</a:t>
+            </a:r>
+            <a:r>
+              <a:rPr lang="en-US" baseline="0" dirty="0" smtClean="0"/>
+              <a:t>/metadata</a:t>
+            </a:r>
+          </a:p>
+          <a:p>
+            <a:r>
+              <a:rPr lang="en-US" baseline="0" dirty="0" smtClean="0"/>
+              <a:t>EML: http://</a:t>
+            </a:r>
+            <a:r>
+              <a:rPr lang="en-US" baseline="0" dirty="0" err="1" smtClean="0"/>
+              <a:t>en.wikipedia.org/wiki/Ecological_Metadata_Language</a:t>
+            </a:r>
+            <a:endParaRPr lang="en-US" baseline="0" dirty="0" smtClean="0"/>
+          </a:p>
+          <a:p>
+            <a:r>
+              <a:rPr lang="en-US" baseline="0" dirty="0" smtClean="0"/>
+              <a:t>TEI: </a:t>
+            </a:r>
+            <a:r>
+              <a:rPr lang="en-US" baseline="0" dirty="0" err="1" smtClean="0"/>
+              <a:t>http://www.tei-c.org/index.xml</a:t>
+            </a:r>
+            <a:endParaRPr lang="en-US" dirty="0"/>
+          </a:p>
+        </p:txBody>
+      </p:sp>
+      <p:sp>
+        <p:nvSpPr>
+          <p:cNvPr id="4" name="Slide Number Placeholder 3"/>
+          <p:cNvSpPr>
+            <a:spLocks noGrp="1"/>
+          </p:cNvSpPr>
+          <p:nvPr>
+            <p:ph type="sldNum" sz="quarter" idx="10"/>
+          </p:nvPr>
+        </p:nvSpPr>
+        <p:spPr/>
+        <p:txBody>
+          <a:bodyPr/>
+          <a:lstStyle/>
+          <a:p>
+            <a:fld id="{7EC0A236-1E09-43D8-9C98-C12E374E11B4}" type="slidenum">
+              <a:rPr lang="en-US" smtClean="0"/>
+              <a:pPr/>
+              <a:t>26</a:t>
+            </a:fld>
+            <a:endParaRPr lang="en-US"/>
+          </a:p>
+        </p:txBody>
+      </p:sp>
+    </p:spTree>
+  </p:cSld>
+  <p:clrMapOvr>
+    <a:masterClrMapping/>
+  </p:clrMapOvr>
+</p:notes>
+</file>
+
+<file path=ppt/notesSlides/notesSlide15.xml><?xml version="1.0" encoding="utf-8"?>
+<p:notes xmlns:a="http://schemas.openxmlformats.org/drawingml/2006/main" xmlns:r="http://schemas.openxmlformats.org/officeDocument/2006/relationships" xmlns:mc="http://schemas.openxmlformats.org/markup-compatibility/2006" xmlns:mv="urn:schemas-microsoft-com:mac:vml" xmlns:p="http://schemas.openxmlformats.org/presentationml/2006/main" mc:Ignorable="mv" mc:PreserveAttributes="mv:*">
+  <p:cSld>
+    <p:spTree>
+      <p:nvGrpSpPr>
+        <p:cNvPr id="1" name=""/>
+        <p:cNvGrpSpPr/>
+        <p:nvPr/>
+      </p:nvGrpSpPr>
+      <p:grpSpPr>
+        <a:xfrm>
+          <a:off x="0" y="0"/>
+          <a:ext cx="0" cy="0"/>
+          <a:chOff x="0" y="0"/>
+          <a:chExt cx="0" cy="0"/>
+        </a:xfrm>
+      </p:grpSpPr>
+      <p:sp>
+        <p:nvSpPr>
+          <p:cNvPr id="2" name="Slide Image Placeholder 1"/>
+          <p:cNvSpPr>
+            <a:spLocks noGrp="1" noRot="1" noChangeAspect="1"/>
+          </p:cNvSpPr>
+          <p:nvPr>
+            <p:ph type="sldImg"/>
+          </p:nvPr>
+        </p:nvSpPr>
+        <p:spPr/>
+      </p:sp>
+      <p:sp>
+        <p:nvSpPr>
+          <p:cNvPr id="3" name="Notes Placeholder 2"/>
+          <p:cNvSpPr>
+            <a:spLocks noGrp="1"/>
+          </p:cNvSpPr>
+          <p:nvPr>
+            <p:ph type="body" idx="1"/>
+          </p:nvPr>
+        </p:nvSpPr>
+        <p:spPr/>
+        <p:txBody>
+          <a:bodyPr>
+            <a:normAutofit/>
+          </a:bodyPr>
+          <a:lstStyle/>
+          <a:p>
+            <a:r>
+              <a:rPr lang="en-US" dirty="0" smtClean="0"/>
+              <a:t>http://</a:t>
+            </a:r>
+            <a:r>
+              <a:rPr lang="en-US" dirty="0" err="1" smtClean="0"/>
+              <a:t>schema.org</a:t>
+            </a:r>
+            <a:endParaRPr lang="en-US" dirty="0"/>
+          </a:p>
+        </p:txBody>
+      </p:sp>
+      <p:sp>
+        <p:nvSpPr>
+          <p:cNvPr id="4" name="Slide Number Placeholder 3"/>
+          <p:cNvSpPr>
+            <a:spLocks noGrp="1"/>
+          </p:cNvSpPr>
+          <p:nvPr>
+            <p:ph type="sldNum" sz="quarter" idx="10"/>
+          </p:nvPr>
+        </p:nvSpPr>
+        <p:spPr/>
+        <p:txBody>
+          <a:bodyPr/>
+          <a:lstStyle/>
+          <a:p>
+            <a:fld id="{7EC0A236-1E09-43D8-9C98-C12E374E11B4}" type="slidenum">
+              <a:rPr lang="en-US" smtClean="0"/>
+              <a:pPr/>
+              <a:t>27</a:t>
+            </a:fld>
+            <a:endParaRPr lang="en-US"/>
+          </a:p>
+        </p:txBody>
+      </p:sp>
+    </p:spTree>
+  </p:cSld>
+  <p:clrMapOvr>
+    <a:masterClrMapping/>
+  </p:clrMapOvr>
+</p:notes>
+</file>
+
+<file path=ppt/notesSlides/notesSlide16.xml><?xml version="1.0" encoding="utf-8"?>
+<p:notes xmlns:a="http://schemas.openxmlformats.org/drawingml/2006/main" xmlns:r="http://schemas.openxmlformats.org/officeDocument/2006/relationships" xmlns:mc="http://schemas.openxmlformats.org/markup-compatibility/2006" xmlns:mv="urn:schemas-microsoft-com:mac:vml" xmlns:p="http://schemas.openxmlformats.org/presentationml/2006/main" mc:Ignorable="mv" mc:PreserveAttributes="mv:*">
+  <p:cSld>
+    <p:spTree>
+      <p:nvGrpSpPr>
+        <p:cNvPr id="1" name=""/>
+        <p:cNvGrpSpPr/>
+        <p:nvPr/>
+      </p:nvGrpSpPr>
+      <p:grpSpPr>
+        <a:xfrm>
+          <a:off x="0" y="0"/>
+          <a:ext cx="0" cy="0"/>
+          <a:chOff x="0" y="0"/>
+          <a:chExt cx="0" cy="0"/>
+        </a:xfrm>
+      </p:grpSpPr>
+      <p:sp>
+        <p:nvSpPr>
+          <p:cNvPr id="2" name="Slide Image Placeholder 1"/>
+          <p:cNvSpPr>
+            <a:spLocks noGrp="1" noRot="1" noChangeAspect="1"/>
+          </p:cNvSpPr>
+          <p:nvPr>
+            <p:ph type="sldImg"/>
+          </p:nvPr>
+        </p:nvSpPr>
+        <p:spPr/>
+      </p:sp>
+      <p:sp>
+        <p:nvSpPr>
+          <p:cNvPr id="3" name="Notes Placeholder 2"/>
+          <p:cNvSpPr>
+            <a:spLocks noGrp="1"/>
+          </p:cNvSpPr>
+          <p:nvPr>
+            <p:ph type="body" idx="1"/>
+          </p:nvPr>
+        </p:nvSpPr>
+        <p:spPr/>
+        <p:txBody>
+          <a:bodyPr>
+            <a:normAutofit/>
+          </a:bodyPr>
+          <a:lstStyle/>
+          <a:p>
+            <a:r>
+              <a:rPr lang="en-US" dirty="0" smtClean="0"/>
+              <a:t>http://</a:t>
+            </a:r>
+            <a:r>
+              <a:rPr lang="en-US" dirty="0" err="1" smtClean="0"/>
+              <a:t>bibframe.org</a:t>
+            </a:r>
+            <a:endParaRPr lang="en-US" dirty="0"/>
+          </a:p>
+        </p:txBody>
+      </p:sp>
+      <p:sp>
+        <p:nvSpPr>
+          <p:cNvPr id="4" name="Slide Number Placeholder 3"/>
+          <p:cNvSpPr>
+            <a:spLocks noGrp="1"/>
+          </p:cNvSpPr>
+          <p:nvPr>
+            <p:ph type="sldNum" sz="quarter" idx="10"/>
+          </p:nvPr>
+        </p:nvSpPr>
+        <p:spPr/>
+        <p:txBody>
+          <a:bodyPr/>
+          <a:lstStyle/>
+          <a:p>
+            <a:fld id="{7EC0A236-1E09-43D8-9C98-C12E374E11B4}" type="slidenum">
+              <a:rPr lang="en-US" smtClean="0"/>
+              <a:pPr/>
+              <a:t>28</a:t>
+            </a:fld>
+            <a:endParaRPr lang="en-US"/>
+          </a:p>
+        </p:txBody>
+      </p:sp>
+    </p:spTree>
+  </p:cSld>
+  <p:clrMapOvr>
+    <a:masterClrMapping/>
+  </p:clrMapOvr>
+</p:notes>
+</file>
+
+<file path=ppt/notesSlides/notesSlide17.xml><?xml version="1.0" encoding="utf-8"?>
+<p:notes xmlns:a="http://schemas.openxmlformats.org/drawingml/2006/main" xmlns:r="http://schemas.openxmlformats.org/officeDocument/2006/relationships" xmlns:mc="http://schemas.openxmlformats.org/markup-compatibility/2006" xmlns:mv="urn:schemas-microsoft-com:mac:vml" xmlns:p="http://schemas.openxmlformats.org/presentationml/2006/main" mc:Ignorable="mv" mc:PreserveAttributes="mv:*">
+  <p:cSld>
+    <p:spTree>
+      <p:nvGrpSpPr>
+        <p:cNvPr id="1" name=""/>
+        <p:cNvGrpSpPr/>
+        <p:nvPr/>
+      </p:nvGrpSpPr>
+      <p:grpSpPr>
+        <a:xfrm>
+          <a:off x="0" y="0"/>
+          <a:ext cx="0" cy="0"/>
+          <a:chOff x="0" y="0"/>
+          <a:chExt cx="0" cy="0"/>
+        </a:xfrm>
+      </p:grpSpPr>
+      <p:sp>
+        <p:nvSpPr>
+          <p:cNvPr id="2" name="Slide Image Placeholder 1"/>
+          <p:cNvSpPr>
+            <a:spLocks noGrp="1" noRot="1" noChangeAspect="1"/>
+          </p:cNvSpPr>
+          <p:nvPr>
+            <p:ph type="sldImg"/>
+          </p:nvPr>
+        </p:nvSpPr>
+        <p:spPr/>
+      </p:sp>
+      <p:sp>
+        <p:nvSpPr>
+          <p:cNvPr id="3" name="Notes Placeholder 2"/>
+          <p:cNvSpPr>
+            <a:spLocks noGrp="1"/>
+          </p:cNvSpPr>
+          <p:nvPr>
+            <p:ph type="body" idx="1"/>
+          </p:nvPr>
+        </p:nvSpPr>
+        <p:spPr/>
+        <p:txBody>
+          <a:bodyPr/>
+          <a:lstStyle/>
+          <a:p>
+            <a:r>
+              <a:rPr lang="en-US" dirty="0" smtClean="0"/>
+              <a:t>http://www.worldcat.org/title/kochbuch-selbsterprobter-rezepte/oclc/</a:t>
+            </a:r>
+            <a:r>
+              <a:rPr lang="en-US" dirty="0" smtClean="0"/>
+              <a:t>51688187</a:t>
+            </a:r>
+          </a:p>
+          <a:p>
+            <a:endParaRPr lang="en-US" dirty="0" smtClean="0"/>
+          </a:p>
+          <a:p>
+            <a:r>
+              <a:rPr lang="en-US" dirty="0" smtClean="0"/>
+              <a:t>(or any OCLC record, just scroll down to the bottom and expand the “Linked Data</a:t>
+            </a:r>
+            <a:r>
+              <a:rPr lang="en-US" smtClean="0"/>
+              <a:t>” tab)</a:t>
+            </a:r>
+            <a:endParaRPr lang="en-US" dirty="0"/>
+          </a:p>
+        </p:txBody>
+      </p:sp>
+      <p:sp>
+        <p:nvSpPr>
+          <p:cNvPr id="4" name="Slide Number Placeholder 3"/>
+          <p:cNvSpPr>
+            <a:spLocks noGrp="1"/>
+          </p:cNvSpPr>
+          <p:nvPr>
+            <p:ph type="sldNum" sz="quarter" idx="10"/>
+          </p:nvPr>
+        </p:nvSpPr>
+        <p:spPr/>
+        <p:txBody>
+          <a:bodyPr/>
+          <a:lstStyle/>
+          <a:p>
+            <a:fld id="{7EC0A236-1E09-43D8-9C98-C12E374E11B4}" type="slidenum">
+              <a:rPr lang="en-US" smtClean="0"/>
+              <a:pPr/>
               <a:t>30</a:t>
             </a:fld>
             <a:endParaRPr lang="en-US"/>
@@ -921,7 +1352,739 @@
     </p:spTree>
     <p:extLst>
       <p:ext uri="{BB962C8B-B14F-4D97-AF65-F5344CB8AC3E}">
-        <p14:creationId xmlns:p14="http://schemas.microsoft.com/office/powerpoint/2010/main" val="585533100"/>
+        <p14:creationId xmlns:p14="http://schemas.microsoft.com/office/powerpoint/2010/main" xmlns:p="http://schemas.openxmlformats.org/presentationml/2006/main" xmlns:r="http://schemas.openxmlformats.org/officeDocument/2006/relationships" xmlns:a="http://schemas.openxmlformats.org/drawingml/2006/main" xmlns="" val="585533100"/>
+      </p:ext>
+    </p:extLst>
+  </p:cSld>
+  <p:clrMapOvr>
+    <a:masterClrMapping/>
+  </p:clrMapOvr>
+</p:notes>
+</file>
+
+<file path=ppt/notesSlides/notesSlide2.xml><?xml version="1.0" encoding="utf-8"?>
+<p:notes xmlns:a="http://schemas.openxmlformats.org/drawingml/2006/main" xmlns:r="http://schemas.openxmlformats.org/officeDocument/2006/relationships" xmlns:mc="http://schemas.openxmlformats.org/markup-compatibility/2006" xmlns:mv="urn:schemas-microsoft-com:mac:vml" xmlns:p="http://schemas.openxmlformats.org/presentationml/2006/main" mc:Ignorable="mv" mc:PreserveAttributes="mv:*">
+  <p:cSld>
+    <p:spTree>
+      <p:nvGrpSpPr>
+        <p:cNvPr id="1" name=""/>
+        <p:cNvGrpSpPr/>
+        <p:nvPr/>
+      </p:nvGrpSpPr>
+      <p:grpSpPr>
+        <a:xfrm>
+          <a:off x="0" y="0"/>
+          <a:ext cx="0" cy="0"/>
+          <a:chOff x="0" y="0"/>
+          <a:chExt cx="0" cy="0"/>
+        </a:xfrm>
+      </p:grpSpPr>
+      <p:sp>
+        <p:nvSpPr>
+          <p:cNvPr id="2" name="Slide Image Placeholder 1"/>
+          <p:cNvSpPr>
+            <a:spLocks noGrp="1" noRot="1" noChangeAspect="1"/>
+          </p:cNvSpPr>
+          <p:nvPr>
+            <p:ph type="sldImg"/>
+          </p:nvPr>
+        </p:nvSpPr>
+        <p:spPr/>
+      </p:sp>
+      <p:sp>
+        <p:nvSpPr>
+          <p:cNvPr id="3" name="Notes Placeholder 2"/>
+          <p:cNvSpPr>
+            <a:spLocks noGrp="1"/>
+          </p:cNvSpPr>
+          <p:nvPr>
+            <p:ph type="body" idx="1"/>
+          </p:nvPr>
+        </p:nvSpPr>
+        <p:spPr/>
+        <p:txBody>
+          <a:bodyPr>
+            <a:normAutofit/>
+          </a:bodyPr>
+          <a:lstStyle/>
+          <a:p>
+            <a:r>
+              <a:rPr lang="en-US" dirty="0" smtClean="0">
+                <a:hlinkClick r:id="rId3"/>
+              </a:rPr>
+              <a:t>http://dx.doi.org/10.1177/0165551509337871</a:t>
+            </a:r>
+            <a:r>
+              <a:rPr lang="en-US" dirty="0" smtClean="0"/>
+              <a:t> </a:t>
+            </a:r>
+            <a:endParaRPr lang="en-US" dirty="0"/>
+          </a:p>
+        </p:txBody>
+      </p:sp>
+      <p:sp>
+        <p:nvSpPr>
+          <p:cNvPr id="4" name="Slide Number Placeholder 3"/>
+          <p:cNvSpPr>
+            <a:spLocks noGrp="1"/>
+          </p:cNvSpPr>
+          <p:nvPr>
+            <p:ph type="sldNum" sz="quarter" idx="10"/>
+          </p:nvPr>
+        </p:nvSpPr>
+        <p:spPr/>
+        <p:txBody>
+          <a:bodyPr/>
+          <a:lstStyle/>
+          <a:p>
+            <a:fld id="{7EC0A236-1E09-43D8-9C98-C12E374E11B4}" type="slidenum">
+              <a:rPr lang="en-US" smtClean="0"/>
+              <a:pPr/>
+              <a:t>8</a:t>
+            </a:fld>
+            <a:endParaRPr lang="en-US"/>
+          </a:p>
+        </p:txBody>
+      </p:sp>
+    </p:spTree>
+  </p:cSld>
+  <p:clrMapOvr>
+    <a:masterClrMapping/>
+  </p:clrMapOvr>
+</p:notes>
+</file>
+
+<file path=ppt/notesSlides/notesSlide3.xml><?xml version="1.0" encoding="utf-8"?>
+<p:notes xmlns:a="http://schemas.openxmlformats.org/drawingml/2006/main" xmlns:r="http://schemas.openxmlformats.org/officeDocument/2006/relationships" xmlns:mc="http://schemas.openxmlformats.org/markup-compatibility/2006" xmlns:mv="urn:schemas-microsoft-com:mac:vml" xmlns:p="http://schemas.openxmlformats.org/presentationml/2006/main" mc:Ignorable="mv" mc:PreserveAttributes="mv:*">
+  <p:cSld>
+    <p:spTree>
+      <p:nvGrpSpPr>
+        <p:cNvPr id="1" name=""/>
+        <p:cNvGrpSpPr/>
+        <p:nvPr/>
+      </p:nvGrpSpPr>
+      <p:grpSpPr>
+        <a:xfrm>
+          <a:off x="0" y="0"/>
+          <a:ext cx="0" cy="0"/>
+          <a:chOff x="0" y="0"/>
+          <a:chExt cx="0" cy="0"/>
+        </a:xfrm>
+      </p:grpSpPr>
+      <p:sp>
+        <p:nvSpPr>
+          <p:cNvPr id="2" name="Slide Image Placeholder 1"/>
+          <p:cNvSpPr>
+            <a:spLocks noGrp="1" noRot="1" noChangeAspect="1"/>
+          </p:cNvSpPr>
+          <p:nvPr>
+            <p:ph type="sldImg"/>
+          </p:nvPr>
+        </p:nvSpPr>
+        <p:spPr/>
+      </p:sp>
+      <p:sp>
+        <p:nvSpPr>
+          <p:cNvPr id="3" name="Notes Placeholder 2"/>
+          <p:cNvSpPr>
+            <a:spLocks noGrp="1"/>
+          </p:cNvSpPr>
+          <p:nvPr>
+            <p:ph type="body" idx="1"/>
+          </p:nvPr>
+        </p:nvSpPr>
+        <p:spPr/>
+        <p:txBody>
+          <a:bodyPr>
+            <a:normAutofit/>
+          </a:bodyPr>
+          <a:lstStyle/>
+          <a:p>
+            <a:r>
+              <a:rPr lang="en-US" dirty="0" smtClean="0"/>
+              <a:t>http://</a:t>
+            </a:r>
+            <a:r>
+              <a:rPr lang="en-US" dirty="0" err="1" smtClean="0"/>
+              <a:t>www.loc.gov</a:t>
+            </a:r>
+            <a:r>
+              <a:rPr lang="en-US" dirty="0" smtClean="0"/>
+              <a:t>/marc</a:t>
+            </a:r>
+          </a:p>
+          <a:p>
+            <a:r>
+              <a:rPr lang="en-US" dirty="0" smtClean="0"/>
+              <a:t>http://</a:t>
+            </a:r>
+            <a:r>
+              <a:rPr lang="en-US" dirty="0" err="1" smtClean="0"/>
+              <a:t>oclc.org/bibformats/en.html</a:t>
+            </a:r>
+            <a:endParaRPr lang="en-US" dirty="0"/>
+          </a:p>
+        </p:txBody>
+      </p:sp>
+      <p:sp>
+        <p:nvSpPr>
+          <p:cNvPr id="4" name="Slide Number Placeholder 3"/>
+          <p:cNvSpPr>
+            <a:spLocks noGrp="1"/>
+          </p:cNvSpPr>
+          <p:nvPr>
+            <p:ph type="sldNum" sz="quarter" idx="10"/>
+          </p:nvPr>
+        </p:nvSpPr>
+        <p:spPr/>
+        <p:txBody>
+          <a:bodyPr/>
+          <a:lstStyle/>
+          <a:p>
+            <a:fld id="{7EC0A236-1E09-43D8-9C98-C12E374E11B4}" type="slidenum">
+              <a:rPr lang="en-US" smtClean="0"/>
+              <a:pPr/>
+              <a:t>13</a:t>
+            </a:fld>
+            <a:endParaRPr lang="en-US"/>
+          </a:p>
+        </p:txBody>
+      </p:sp>
+    </p:spTree>
+  </p:cSld>
+  <p:clrMapOvr>
+    <a:masterClrMapping/>
+  </p:clrMapOvr>
+</p:notes>
+</file>
+
+<file path=ppt/notesSlides/notesSlide4.xml><?xml version="1.0" encoding="utf-8"?>
+<p:notes xmlns:a="http://schemas.openxmlformats.org/drawingml/2006/main" xmlns:r="http://schemas.openxmlformats.org/officeDocument/2006/relationships" xmlns:mc="http://schemas.openxmlformats.org/markup-compatibility/2006" xmlns:mv="urn:schemas-microsoft-com:mac:vml" xmlns:p="http://schemas.openxmlformats.org/presentationml/2006/main" mc:Ignorable="mv" mc:PreserveAttributes="mv:*">
+  <p:cSld>
+    <p:spTree>
+      <p:nvGrpSpPr>
+        <p:cNvPr id="1" name=""/>
+        <p:cNvGrpSpPr/>
+        <p:nvPr/>
+      </p:nvGrpSpPr>
+      <p:grpSpPr>
+        <a:xfrm>
+          <a:off x="0" y="0"/>
+          <a:ext cx="0" cy="0"/>
+          <a:chOff x="0" y="0"/>
+          <a:chExt cx="0" cy="0"/>
+        </a:xfrm>
+      </p:grpSpPr>
+      <p:sp>
+        <p:nvSpPr>
+          <p:cNvPr id="2" name="Slide Image Placeholder 1"/>
+          <p:cNvSpPr>
+            <a:spLocks noGrp="1" noRot="1" noChangeAspect="1"/>
+          </p:cNvSpPr>
+          <p:nvPr>
+            <p:ph type="sldImg"/>
+          </p:nvPr>
+        </p:nvSpPr>
+        <p:spPr/>
+      </p:sp>
+      <p:sp>
+        <p:nvSpPr>
+          <p:cNvPr id="3" name="Notes Placeholder 2"/>
+          <p:cNvSpPr>
+            <a:spLocks noGrp="1"/>
+          </p:cNvSpPr>
+          <p:nvPr>
+            <p:ph type="body" idx="1"/>
+          </p:nvPr>
+        </p:nvSpPr>
+        <p:spPr/>
+        <p:txBody>
+          <a:bodyPr>
+            <a:normAutofit/>
+          </a:bodyPr>
+          <a:lstStyle/>
+          <a:p>
+            <a:r>
+              <a:rPr lang="en-US" dirty="0" smtClean="0"/>
+              <a:t>http://</a:t>
+            </a:r>
+            <a:r>
+              <a:rPr lang="en-US" dirty="0" err="1" smtClean="0"/>
+              <a:t>loc.gov/standards/mods</a:t>
+            </a:r>
+            <a:endParaRPr lang="en-US" dirty="0"/>
+          </a:p>
+        </p:txBody>
+      </p:sp>
+      <p:sp>
+        <p:nvSpPr>
+          <p:cNvPr id="4" name="Slide Number Placeholder 3"/>
+          <p:cNvSpPr>
+            <a:spLocks noGrp="1"/>
+          </p:cNvSpPr>
+          <p:nvPr>
+            <p:ph type="sldNum" sz="quarter" idx="10"/>
+          </p:nvPr>
+        </p:nvSpPr>
+        <p:spPr/>
+        <p:txBody>
+          <a:bodyPr/>
+          <a:lstStyle/>
+          <a:p>
+            <a:fld id="{7EC0A236-1E09-43D8-9C98-C12E374E11B4}" type="slidenum">
+              <a:rPr lang="en-US" smtClean="0"/>
+              <a:pPr/>
+              <a:t>15</a:t>
+            </a:fld>
+            <a:endParaRPr lang="en-US"/>
+          </a:p>
+        </p:txBody>
+      </p:sp>
+    </p:spTree>
+  </p:cSld>
+  <p:clrMapOvr>
+    <a:masterClrMapping/>
+  </p:clrMapOvr>
+</p:notes>
+</file>
+
+<file path=ppt/notesSlides/notesSlide5.xml><?xml version="1.0" encoding="utf-8"?>
+<p:notes xmlns:a="http://schemas.openxmlformats.org/drawingml/2006/main" xmlns:r="http://schemas.openxmlformats.org/officeDocument/2006/relationships" xmlns:mc="http://schemas.openxmlformats.org/markup-compatibility/2006" xmlns:mv="urn:schemas-microsoft-com:mac:vml" xmlns:p="http://schemas.openxmlformats.org/presentationml/2006/main" mc:Ignorable="mv" mc:PreserveAttributes="mv:*">
+  <p:cSld>
+    <p:spTree>
+      <p:nvGrpSpPr>
+        <p:cNvPr id="1" name=""/>
+        <p:cNvGrpSpPr/>
+        <p:nvPr/>
+      </p:nvGrpSpPr>
+      <p:grpSpPr>
+        <a:xfrm>
+          <a:off x="0" y="0"/>
+          <a:ext cx="0" cy="0"/>
+          <a:chOff x="0" y="0"/>
+          <a:chExt cx="0" cy="0"/>
+        </a:xfrm>
+      </p:grpSpPr>
+      <p:sp>
+        <p:nvSpPr>
+          <p:cNvPr id="2" name="Slide Image Placeholder 1"/>
+          <p:cNvSpPr>
+            <a:spLocks noGrp="1" noRot="1" noChangeAspect="1"/>
+          </p:cNvSpPr>
+          <p:nvPr>
+            <p:ph type="sldImg"/>
+          </p:nvPr>
+        </p:nvSpPr>
+        <p:spPr/>
+      </p:sp>
+      <p:sp>
+        <p:nvSpPr>
+          <p:cNvPr id="3" name="Notes Placeholder 2"/>
+          <p:cNvSpPr>
+            <a:spLocks noGrp="1"/>
+          </p:cNvSpPr>
+          <p:nvPr>
+            <p:ph type="body" idx="1"/>
+          </p:nvPr>
+        </p:nvSpPr>
+        <p:spPr/>
+        <p:txBody>
+          <a:bodyPr/>
+          <a:lstStyle/>
+          <a:p>
+            <a:r>
+              <a:rPr lang="en-US" dirty="0" smtClean="0"/>
+              <a:t>http://www.loc.gov/standards/mods/mods-dcsimple.html</a:t>
+            </a:r>
+            <a:endParaRPr lang="en-US" dirty="0"/>
+          </a:p>
+        </p:txBody>
+      </p:sp>
+      <p:sp>
+        <p:nvSpPr>
+          <p:cNvPr id="4" name="Slide Number Placeholder 3"/>
+          <p:cNvSpPr>
+            <a:spLocks noGrp="1"/>
+          </p:cNvSpPr>
+          <p:nvPr>
+            <p:ph type="sldNum" sz="quarter" idx="10"/>
+          </p:nvPr>
+        </p:nvSpPr>
+        <p:spPr/>
+        <p:txBody>
+          <a:bodyPr/>
+          <a:lstStyle/>
+          <a:p>
+            <a:fld id="{7EC0A236-1E09-43D8-9C98-C12E374E11B4}" type="slidenum">
+              <a:rPr lang="en-US" smtClean="0"/>
+              <a:pPr/>
+              <a:t>16</a:t>
+            </a:fld>
+            <a:endParaRPr lang="en-US"/>
+          </a:p>
+        </p:txBody>
+      </p:sp>
+    </p:spTree>
+    <p:extLst>
+      <p:ext uri="{BB962C8B-B14F-4D97-AF65-F5344CB8AC3E}">
+        <p14:creationId xmlns:p14="http://schemas.microsoft.com/office/powerpoint/2010/main" xmlns:p="http://schemas.openxmlformats.org/presentationml/2006/main" xmlns:r="http://schemas.openxmlformats.org/officeDocument/2006/relationships" xmlns:a="http://schemas.openxmlformats.org/drawingml/2006/main" xmlns="" val="2095854483"/>
+      </p:ext>
+    </p:extLst>
+  </p:cSld>
+  <p:clrMapOvr>
+    <a:masterClrMapping/>
+  </p:clrMapOvr>
+</p:notes>
+</file>
+
+<file path=ppt/notesSlides/notesSlide6.xml><?xml version="1.0" encoding="utf-8"?>
+<p:notes xmlns:a="http://schemas.openxmlformats.org/drawingml/2006/main" xmlns:r="http://schemas.openxmlformats.org/officeDocument/2006/relationships" xmlns:mc="http://schemas.openxmlformats.org/markup-compatibility/2006" xmlns:mv="urn:schemas-microsoft-com:mac:vml" xmlns:p="http://schemas.openxmlformats.org/presentationml/2006/main" mc:Ignorable="mv" mc:PreserveAttributes="mv:*">
+  <p:cSld>
+    <p:spTree>
+      <p:nvGrpSpPr>
+        <p:cNvPr id="1" name=""/>
+        <p:cNvGrpSpPr/>
+        <p:nvPr/>
+      </p:nvGrpSpPr>
+      <p:grpSpPr>
+        <a:xfrm>
+          <a:off x="0" y="0"/>
+          <a:ext cx="0" cy="0"/>
+          <a:chOff x="0" y="0"/>
+          <a:chExt cx="0" cy="0"/>
+        </a:xfrm>
+      </p:grpSpPr>
+      <p:sp>
+        <p:nvSpPr>
+          <p:cNvPr id="2" name="Slide Image Placeholder 1"/>
+          <p:cNvSpPr>
+            <a:spLocks noGrp="1" noRot="1" noChangeAspect="1"/>
+          </p:cNvSpPr>
+          <p:nvPr>
+            <p:ph type="sldImg"/>
+          </p:nvPr>
+        </p:nvSpPr>
+        <p:spPr/>
+      </p:sp>
+      <p:sp>
+        <p:nvSpPr>
+          <p:cNvPr id="3" name="Notes Placeholder 2"/>
+          <p:cNvSpPr>
+            <a:spLocks noGrp="1"/>
+          </p:cNvSpPr>
+          <p:nvPr>
+            <p:ph type="body" idx="1"/>
+          </p:nvPr>
+        </p:nvSpPr>
+        <p:spPr/>
+        <p:txBody>
+          <a:bodyPr>
+            <a:normAutofit/>
+          </a:bodyPr>
+          <a:lstStyle/>
+          <a:p>
+            <a:r>
+              <a:rPr lang="en-US" dirty="0" smtClean="0"/>
+              <a:t>http://</a:t>
+            </a:r>
+            <a:r>
+              <a:rPr lang="en-US" dirty="0" err="1" smtClean="0"/>
+              <a:t>core.vraweb.org</a:t>
+            </a:r>
+            <a:endParaRPr lang="en-US" dirty="0" smtClean="0"/>
+          </a:p>
+        </p:txBody>
+      </p:sp>
+      <p:sp>
+        <p:nvSpPr>
+          <p:cNvPr id="4" name="Slide Number Placeholder 3"/>
+          <p:cNvSpPr>
+            <a:spLocks noGrp="1"/>
+          </p:cNvSpPr>
+          <p:nvPr>
+            <p:ph type="sldNum" sz="quarter" idx="10"/>
+          </p:nvPr>
+        </p:nvSpPr>
+        <p:spPr/>
+        <p:txBody>
+          <a:bodyPr/>
+          <a:lstStyle/>
+          <a:p>
+            <a:fld id="{7EC0A236-1E09-43D8-9C98-C12E374E11B4}" type="slidenum">
+              <a:rPr lang="en-US" smtClean="0"/>
+              <a:pPr/>
+              <a:t>17</a:t>
+            </a:fld>
+            <a:endParaRPr lang="en-US"/>
+          </a:p>
+        </p:txBody>
+      </p:sp>
+    </p:spTree>
+  </p:cSld>
+  <p:clrMapOvr>
+    <a:masterClrMapping/>
+  </p:clrMapOvr>
+</p:notes>
+</file>
+
+<file path=ppt/notesSlides/notesSlide7.xml><?xml version="1.0" encoding="utf-8"?>
+<p:notes xmlns:a="http://schemas.openxmlformats.org/drawingml/2006/main" xmlns:r="http://schemas.openxmlformats.org/officeDocument/2006/relationships" xmlns:mc="http://schemas.openxmlformats.org/markup-compatibility/2006" xmlns:mv="urn:schemas-microsoft-com:mac:vml" xmlns:p="http://schemas.openxmlformats.org/presentationml/2006/main" mc:Ignorable="mv" mc:PreserveAttributes="mv:*">
+  <p:cSld>
+    <p:spTree>
+      <p:nvGrpSpPr>
+        <p:cNvPr id="1" name=""/>
+        <p:cNvGrpSpPr/>
+        <p:nvPr/>
+      </p:nvGrpSpPr>
+      <p:grpSpPr>
+        <a:xfrm>
+          <a:off x="0" y="0"/>
+          <a:ext cx="0" cy="0"/>
+          <a:chOff x="0" y="0"/>
+          <a:chExt cx="0" cy="0"/>
+        </a:xfrm>
+      </p:grpSpPr>
+      <p:sp>
+        <p:nvSpPr>
+          <p:cNvPr id="2" name="Slide Image Placeholder 1"/>
+          <p:cNvSpPr>
+            <a:spLocks noGrp="1" noRot="1" noChangeAspect="1"/>
+          </p:cNvSpPr>
+          <p:nvPr>
+            <p:ph type="sldImg"/>
+          </p:nvPr>
+        </p:nvSpPr>
+        <p:spPr/>
+      </p:sp>
+      <p:sp>
+        <p:nvSpPr>
+          <p:cNvPr id="3" name="Notes Placeholder 2"/>
+          <p:cNvSpPr>
+            <a:spLocks noGrp="1"/>
+          </p:cNvSpPr>
+          <p:nvPr>
+            <p:ph type="body" idx="1"/>
+          </p:nvPr>
+        </p:nvSpPr>
+        <p:spPr/>
+        <p:txBody>
+          <a:bodyPr/>
+          <a:lstStyle/>
+          <a:p>
+            <a:r>
+              <a:rPr lang="en-US" dirty="0" smtClean="0"/>
+              <a:t>http://core.vraweb.org/examples/html/example045_full.html</a:t>
+            </a:r>
+            <a:endParaRPr lang="en-US" dirty="0"/>
+          </a:p>
+        </p:txBody>
+      </p:sp>
+      <p:sp>
+        <p:nvSpPr>
+          <p:cNvPr id="4" name="Slide Number Placeholder 3"/>
+          <p:cNvSpPr>
+            <a:spLocks noGrp="1"/>
+          </p:cNvSpPr>
+          <p:nvPr>
+            <p:ph type="sldNum" sz="quarter" idx="10"/>
+          </p:nvPr>
+        </p:nvSpPr>
+        <p:spPr/>
+        <p:txBody>
+          <a:bodyPr/>
+          <a:lstStyle/>
+          <a:p>
+            <a:fld id="{7EC0A236-1E09-43D8-9C98-C12E374E11B4}" type="slidenum">
+              <a:rPr lang="en-US" smtClean="0"/>
+              <a:pPr/>
+              <a:t>18</a:t>
+            </a:fld>
+            <a:endParaRPr lang="en-US"/>
+          </a:p>
+        </p:txBody>
+      </p:sp>
+    </p:spTree>
+    <p:extLst>
+      <p:ext uri="{BB962C8B-B14F-4D97-AF65-F5344CB8AC3E}">
+        <p14:creationId xmlns:p14="http://schemas.microsoft.com/office/powerpoint/2010/main" xmlns:p="http://schemas.openxmlformats.org/presentationml/2006/main" xmlns:r="http://schemas.openxmlformats.org/officeDocument/2006/relationships" xmlns:a="http://schemas.openxmlformats.org/drawingml/2006/main" xmlns="" val="3416184940"/>
+      </p:ext>
+    </p:extLst>
+  </p:cSld>
+  <p:clrMapOvr>
+    <a:masterClrMapping/>
+  </p:clrMapOvr>
+</p:notes>
+</file>
+
+<file path=ppt/notesSlides/notesSlide8.xml><?xml version="1.0" encoding="utf-8"?>
+<p:notes xmlns:a="http://schemas.openxmlformats.org/drawingml/2006/main" xmlns:r="http://schemas.openxmlformats.org/officeDocument/2006/relationships" xmlns:mc="http://schemas.openxmlformats.org/markup-compatibility/2006" xmlns:mv="urn:schemas-microsoft-com:mac:vml" xmlns:p="http://schemas.openxmlformats.org/presentationml/2006/main" mc:Ignorable="mv" mc:PreserveAttributes="mv:*">
+  <p:cSld>
+    <p:spTree>
+      <p:nvGrpSpPr>
+        <p:cNvPr id="1" name=""/>
+        <p:cNvGrpSpPr/>
+        <p:nvPr/>
+      </p:nvGrpSpPr>
+      <p:grpSpPr>
+        <a:xfrm>
+          <a:off x="0" y="0"/>
+          <a:ext cx="0" cy="0"/>
+          <a:chOff x="0" y="0"/>
+          <a:chExt cx="0" cy="0"/>
+        </a:xfrm>
+      </p:grpSpPr>
+      <p:sp>
+        <p:nvSpPr>
+          <p:cNvPr id="2" name="Slide Image Placeholder 1"/>
+          <p:cNvSpPr>
+            <a:spLocks noGrp="1" noRot="1" noChangeAspect="1"/>
+          </p:cNvSpPr>
+          <p:nvPr>
+            <p:ph type="sldImg"/>
+          </p:nvPr>
+        </p:nvSpPr>
+        <p:spPr/>
+      </p:sp>
+      <p:sp>
+        <p:nvSpPr>
+          <p:cNvPr id="3" name="Notes Placeholder 2"/>
+          <p:cNvSpPr>
+            <a:spLocks noGrp="1"/>
+          </p:cNvSpPr>
+          <p:nvPr>
+            <p:ph type="body" idx="1"/>
+          </p:nvPr>
+        </p:nvSpPr>
+        <p:spPr/>
+        <p:txBody>
+          <a:bodyPr/>
+          <a:lstStyle/>
+          <a:p>
+            <a:r>
+              <a:rPr lang="en-US" dirty="0" smtClean="0"/>
+              <a:t>http://core.vraweb.org/examples/html/example045_full.html</a:t>
+            </a:r>
+            <a:endParaRPr lang="en-US" dirty="0"/>
+          </a:p>
+        </p:txBody>
+      </p:sp>
+      <p:sp>
+        <p:nvSpPr>
+          <p:cNvPr id="4" name="Slide Number Placeholder 3"/>
+          <p:cNvSpPr>
+            <a:spLocks noGrp="1"/>
+          </p:cNvSpPr>
+          <p:nvPr>
+            <p:ph type="sldNum" sz="quarter" idx="10"/>
+          </p:nvPr>
+        </p:nvSpPr>
+        <p:spPr/>
+        <p:txBody>
+          <a:bodyPr/>
+          <a:lstStyle/>
+          <a:p>
+            <a:fld id="{7EC0A236-1E09-43D8-9C98-C12E374E11B4}" type="slidenum">
+              <a:rPr lang="en-US" smtClean="0"/>
+              <a:pPr/>
+              <a:t>19</a:t>
+            </a:fld>
+            <a:endParaRPr lang="en-US"/>
+          </a:p>
+        </p:txBody>
+      </p:sp>
+    </p:spTree>
+    <p:extLst>
+      <p:ext uri="{BB962C8B-B14F-4D97-AF65-F5344CB8AC3E}">
+        <p14:creationId xmlns:p14="http://schemas.microsoft.com/office/powerpoint/2010/main" xmlns:p="http://schemas.openxmlformats.org/presentationml/2006/main" xmlns:r="http://schemas.openxmlformats.org/officeDocument/2006/relationships" xmlns:a="http://schemas.openxmlformats.org/drawingml/2006/main" xmlns="" val="2279837458"/>
+      </p:ext>
+    </p:extLst>
+  </p:cSld>
+  <p:clrMapOvr>
+    <a:masterClrMapping/>
+  </p:clrMapOvr>
+</p:notes>
+</file>
+
+<file path=ppt/notesSlides/notesSlide9.xml><?xml version="1.0" encoding="utf-8"?>
+<p:notes xmlns:a="http://schemas.openxmlformats.org/drawingml/2006/main" xmlns:r="http://schemas.openxmlformats.org/officeDocument/2006/relationships" xmlns:mc="http://schemas.openxmlformats.org/markup-compatibility/2006" xmlns:mv="urn:schemas-microsoft-com:mac:vml" xmlns:p="http://schemas.openxmlformats.org/presentationml/2006/main" mc:Ignorable="mv" mc:PreserveAttributes="mv:*">
+  <p:cSld>
+    <p:spTree>
+      <p:nvGrpSpPr>
+        <p:cNvPr id="1" name=""/>
+        <p:cNvGrpSpPr/>
+        <p:nvPr/>
+      </p:nvGrpSpPr>
+      <p:grpSpPr>
+        <a:xfrm>
+          <a:off x="0" y="0"/>
+          <a:ext cx="0" cy="0"/>
+          <a:chOff x="0" y="0"/>
+          <a:chExt cx="0" cy="0"/>
+        </a:xfrm>
+      </p:grpSpPr>
+      <p:sp>
+        <p:nvSpPr>
+          <p:cNvPr id="2" name="Slide Image Placeholder 1"/>
+          <p:cNvSpPr>
+            <a:spLocks noGrp="1" noRot="1" noChangeAspect="1"/>
+          </p:cNvSpPr>
+          <p:nvPr>
+            <p:ph type="sldImg"/>
+          </p:nvPr>
+        </p:nvSpPr>
+        <p:spPr/>
+      </p:sp>
+      <p:sp>
+        <p:nvSpPr>
+          <p:cNvPr id="3" name="Notes Placeholder 2"/>
+          <p:cNvSpPr>
+            <a:spLocks noGrp="1"/>
+          </p:cNvSpPr>
+          <p:nvPr>
+            <p:ph type="body" idx="1"/>
+          </p:nvPr>
+        </p:nvSpPr>
+        <p:spPr/>
+        <p:txBody>
+          <a:bodyPr/>
+          <a:lstStyle/>
+          <a:p>
+            <a:r>
+              <a:rPr lang="en-US" dirty="0" smtClean="0"/>
+              <a:t>http://core.vraweb.org/examples/html/example045_full.html</a:t>
+            </a:r>
+            <a:endParaRPr lang="en-US" dirty="0"/>
+          </a:p>
+        </p:txBody>
+      </p:sp>
+      <p:sp>
+        <p:nvSpPr>
+          <p:cNvPr id="4" name="Slide Number Placeholder 3"/>
+          <p:cNvSpPr>
+            <a:spLocks noGrp="1"/>
+          </p:cNvSpPr>
+          <p:nvPr>
+            <p:ph type="sldNum" sz="quarter" idx="10"/>
+          </p:nvPr>
+        </p:nvSpPr>
+        <p:spPr/>
+        <p:txBody>
+          <a:bodyPr/>
+          <a:lstStyle/>
+          <a:p>
+            <a:fld id="{7EC0A236-1E09-43D8-9C98-C12E374E11B4}" type="slidenum">
+              <a:rPr lang="en-US" smtClean="0"/>
+              <a:pPr/>
+              <a:t>20</a:t>
+            </a:fld>
+            <a:endParaRPr lang="en-US"/>
+          </a:p>
+        </p:txBody>
+      </p:sp>
+    </p:spTree>
+    <p:extLst>
+      <p:ext uri="{BB962C8B-B14F-4D97-AF65-F5344CB8AC3E}">
+        <p14:creationId xmlns:p14="http://schemas.microsoft.com/office/powerpoint/2010/main" xmlns:p="http://schemas.openxmlformats.org/presentationml/2006/main" xmlns:r="http://schemas.openxmlformats.org/officeDocument/2006/relationships" xmlns:a="http://schemas.openxmlformats.org/drawingml/2006/main" xmlns="" val="580125897"/>
       </p:ext>
     </p:extLst>
   </p:cSld>
@@ -932,7 +2095,7 @@
 </file>
 
 <file path=ppt/slideLayouts/slideLayout1.xml><?xml version="1.0" encoding="utf-8"?>
-<p:sldLayout xmlns:a="http://schemas.openxmlformats.org/drawingml/2006/main" xmlns:r="http://schemas.openxmlformats.org/officeDocument/2006/relationships" xmlns:p="http://schemas.openxmlformats.org/presentationml/2006/main" type="title" preserve="1">
+<p:sldLayout xmlns:a="http://schemas.openxmlformats.org/drawingml/2006/main" xmlns:r="http://schemas.openxmlformats.org/officeDocument/2006/relationships" xmlns:mc="http://schemas.openxmlformats.org/markup-compatibility/2006" xmlns:mv="urn:schemas-microsoft-com:mac:vml" xmlns:p="http://schemas.openxmlformats.org/presentationml/2006/main" mc:Ignorable="mv" mc:PreserveAttributes="mv:*" type="title" preserve="1">
   <p:cSld name="Title Slide">
     <p:spTree>
       <p:nvGrpSpPr>
@@ -1113,7 +2276,7 @@
             <a:fld id="{E4FB4266-2A1A-4872-824A-34A98499888B}" type="datetimeFigureOut">
               <a:rPr lang="en-US" smtClean="0"/>
               <a:pPr/>
-              <a:t>4/7/2015</a:t>
+              <a:t>4/7/15</a:t>
             </a:fld>
             <a:endParaRPr lang="en-US"/>
           </a:p>
@@ -1165,7 +2328,7 @@
     </p:spTree>
     <p:extLst>
       <p:ext uri="{BB962C8B-B14F-4D97-AF65-F5344CB8AC3E}">
-        <p14:creationId xmlns:p14="http://schemas.microsoft.com/office/powerpoint/2010/main" val="2206410907"/>
+        <p14:creationId xmlns:p14="http://schemas.microsoft.com/office/powerpoint/2010/main" xmlns:p="http://schemas.openxmlformats.org/presentationml/2006/main" xmlns:r="http://schemas.openxmlformats.org/officeDocument/2006/relationships" xmlns:a="http://schemas.openxmlformats.org/drawingml/2006/main" xmlns="" val="2206410907"/>
       </p:ext>
     </p:extLst>
   </p:cSld>
@@ -1176,7 +2339,7 @@
 </file>
 
 <file path=ppt/slideLayouts/slideLayout10.xml><?xml version="1.0" encoding="utf-8"?>
-<p:sldLayout xmlns:a="http://schemas.openxmlformats.org/drawingml/2006/main" xmlns:r="http://schemas.openxmlformats.org/officeDocument/2006/relationships" xmlns:p="http://schemas.openxmlformats.org/presentationml/2006/main" type="vertTx" preserve="1">
+<p:sldLayout xmlns:a="http://schemas.openxmlformats.org/drawingml/2006/main" xmlns:r="http://schemas.openxmlformats.org/officeDocument/2006/relationships" xmlns:mc="http://schemas.openxmlformats.org/markup-compatibility/2006" xmlns:mv="urn:schemas-microsoft-com:mac:vml" xmlns:p="http://schemas.openxmlformats.org/presentationml/2006/main" mc:Ignorable="mv" mc:PreserveAttributes="mv:*" type="vertTx" preserve="1">
   <p:cSld name="Title and Vertical Text">
     <p:spTree>
       <p:nvGrpSpPr>
@@ -1285,7 +2448,7 @@
             <a:fld id="{E4FB4266-2A1A-4872-824A-34A98499888B}" type="datetimeFigureOut">
               <a:rPr lang="en-US" smtClean="0"/>
               <a:pPr/>
-              <a:t>4/7/2015</a:t>
+              <a:t>4/7/15</a:t>
             </a:fld>
             <a:endParaRPr lang="en-US"/>
           </a:p>
@@ -1337,7 +2500,7 @@
     </p:spTree>
     <p:extLst>
       <p:ext uri="{BB962C8B-B14F-4D97-AF65-F5344CB8AC3E}">
-        <p14:creationId xmlns:p14="http://schemas.microsoft.com/office/powerpoint/2010/main" val="2147782927"/>
+        <p14:creationId xmlns:p14="http://schemas.microsoft.com/office/powerpoint/2010/main" xmlns:p="http://schemas.openxmlformats.org/presentationml/2006/main" xmlns:r="http://schemas.openxmlformats.org/officeDocument/2006/relationships" xmlns:a="http://schemas.openxmlformats.org/drawingml/2006/main" xmlns="" val="2147782927"/>
       </p:ext>
     </p:extLst>
   </p:cSld>
@@ -1348,7 +2511,7 @@
 </file>
 
 <file path=ppt/slideLayouts/slideLayout11.xml><?xml version="1.0" encoding="utf-8"?>
-<p:sldLayout xmlns:a="http://schemas.openxmlformats.org/drawingml/2006/main" xmlns:r="http://schemas.openxmlformats.org/officeDocument/2006/relationships" xmlns:p="http://schemas.openxmlformats.org/presentationml/2006/main" type="vertTitleAndTx" preserve="1">
+<p:sldLayout xmlns:a="http://schemas.openxmlformats.org/drawingml/2006/main" xmlns:r="http://schemas.openxmlformats.org/officeDocument/2006/relationships" xmlns:mc="http://schemas.openxmlformats.org/markup-compatibility/2006" xmlns:mv="urn:schemas-microsoft-com:mac:vml" xmlns:p="http://schemas.openxmlformats.org/presentationml/2006/main" mc:Ignorable="mv" mc:PreserveAttributes="mv:*" type="vertTitleAndTx" preserve="1">
   <p:cSld name="Vertical Title and Text">
     <p:spTree>
       <p:nvGrpSpPr>
@@ -1467,7 +2630,7 @@
             <a:fld id="{E4FB4266-2A1A-4872-824A-34A98499888B}" type="datetimeFigureOut">
               <a:rPr lang="en-US" smtClean="0"/>
               <a:pPr/>
-              <a:t>4/7/2015</a:t>
+              <a:t>4/7/15</a:t>
             </a:fld>
             <a:endParaRPr lang="en-US"/>
           </a:p>
@@ -1519,7 +2682,7 @@
     </p:spTree>
     <p:extLst>
       <p:ext uri="{BB962C8B-B14F-4D97-AF65-F5344CB8AC3E}">
-        <p14:creationId xmlns:p14="http://schemas.microsoft.com/office/powerpoint/2010/main" val="1957928889"/>
+        <p14:creationId xmlns:p14="http://schemas.microsoft.com/office/powerpoint/2010/main" xmlns:p="http://schemas.openxmlformats.org/presentationml/2006/main" xmlns:r="http://schemas.openxmlformats.org/officeDocument/2006/relationships" xmlns:a="http://schemas.openxmlformats.org/drawingml/2006/main" xmlns="" val="1957928889"/>
       </p:ext>
     </p:extLst>
   </p:cSld>
@@ -1530,7 +2693,7 @@
 </file>
 
 <file path=ppt/slideLayouts/slideLayout2.xml><?xml version="1.0" encoding="utf-8"?>
-<p:sldLayout xmlns:a="http://schemas.openxmlformats.org/drawingml/2006/main" xmlns:r="http://schemas.openxmlformats.org/officeDocument/2006/relationships" xmlns:p="http://schemas.openxmlformats.org/presentationml/2006/main" type="obj" preserve="1">
+<p:sldLayout xmlns:a="http://schemas.openxmlformats.org/drawingml/2006/main" xmlns:r="http://schemas.openxmlformats.org/officeDocument/2006/relationships" xmlns:mc="http://schemas.openxmlformats.org/markup-compatibility/2006" xmlns:mv="urn:schemas-microsoft-com:mac:vml" xmlns:p="http://schemas.openxmlformats.org/presentationml/2006/main" mc:Ignorable="mv" mc:PreserveAttributes="mv:*" type="obj" preserve="1">
   <p:cSld name="Title and Content">
     <p:spTree>
       <p:nvGrpSpPr>
@@ -1639,7 +2802,7 @@
             <a:fld id="{E4FB4266-2A1A-4872-824A-34A98499888B}" type="datetimeFigureOut">
               <a:rPr lang="en-US" smtClean="0"/>
               <a:pPr/>
-              <a:t>4/7/2015</a:t>
+              <a:t>4/7/15</a:t>
             </a:fld>
             <a:endParaRPr lang="en-US"/>
           </a:p>
@@ -1691,7 +2854,7 @@
     </p:spTree>
     <p:extLst>
       <p:ext uri="{BB962C8B-B14F-4D97-AF65-F5344CB8AC3E}">
-        <p14:creationId xmlns:p14="http://schemas.microsoft.com/office/powerpoint/2010/main" val="679760071"/>
+        <p14:creationId xmlns:p14="http://schemas.microsoft.com/office/powerpoint/2010/main" xmlns:p="http://schemas.openxmlformats.org/presentationml/2006/main" xmlns:r="http://schemas.openxmlformats.org/officeDocument/2006/relationships" xmlns:a="http://schemas.openxmlformats.org/drawingml/2006/main" xmlns="" val="679760071"/>
       </p:ext>
     </p:extLst>
   </p:cSld>
@@ -1702,7 +2865,7 @@
 </file>
 
 <file path=ppt/slideLayouts/slideLayout3.xml><?xml version="1.0" encoding="utf-8"?>
-<p:sldLayout xmlns:a="http://schemas.openxmlformats.org/drawingml/2006/main" xmlns:r="http://schemas.openxmlformats.org/officeDocument/2006/relationships" xmlns:p="http://schemas.openxmlformats.org/presentationml/2006/main" type="secHead" preserve="1">
+<p:sldLayout xmlns:a="http://schemas.openxmlformats.org/drawingml/2006/main" xmlns:r="http://schemas.openxmlformats.org/officeDocument/2006/relationships" xmlns:mc="http://schemas.openxmlformats.org/markup-compatibility/2006" xmlns:mv="urn:schemas-microsoft-com:mac:vml" xmlns:p="http://schemas.openxmlformats.org/presentationml/2006/main" mc:Ignorable="mv" mc:PreserveAttributes="mv:*" type="secHead" preserve="1">
   <p:cSld name="Section Header">
     <p:spTree>
       <p:nvGrpSpPr>
@@ -1887,7 +3050,7 @@
             <a:fld id="{E4FB4266-2A1A-4872-824A-34A98499888B}" type="datetimeFigureOut">
               <a:rPr lang="en-US" smtClean="0"/>
               <a:pPr/>
-              <a:t>4/7/2015</a:t>
+              <a:t>4/7/15</a:t>
             </a:fld>
             <a:endParaRPr lang="en-US"/>
           </a:p>
@@ -1939,7 +3102,7 @@
     </p:spTree>
     <p:extLst>
       <p:ext uri="{BB962C8B-B14F-4D97-AF65-F5344CB8AC3E}">
-        <p14:creationId xmlns:p14="http://schemas.microsoft.com/office/powerpoint/2010/main" val="227953848"/>
+        <p14:creationId xmlns:p14="http://schemas.microsoft.com/office/powerpoint/2010/main" xmlns:p="http://schemas.openxmlformats.org/presentationml/2006/main" xmlns:r="http://schemas.openxmlformats.org/officeDocument/2006/relationships" xmlns:a="http://schemas.openxmlformats.org/drawingml/2006/main" xmlns="" val="227953848"/>
       </p:ext>
     </p:extLst>
   </p:cSld>
@@ -1950,7 +3113,7 @@
 </file>
 
 <file path=ppt/slideLayouts/slideLayout4.xml><?xml version="1.0" encoding="utf-8"?>
-<p:sldLayout xmlns:a="http://schemas.openxmlformats.org/drawingml/2006/main" xmlns:r="http://schemas.openxmlformats.org/officeDocument/2006/relationships" xmlns:p="http://schemas.openxmlformats.org/presentationml/2006/main" type="twoObj" preserve="1">
+<p:sldLayout xmlns:a="http://schemas.openxmlformats.org/drawingml/2006/main" xmlns:r="http://schemas.openxmlformats.org/officeDocument/2006/relationships" xmlns:mc="http://schemas.openxmlformats.org/markup-compatibility/2006" xmlns:mv="urn:schemas-microsoft-com:mac:vml" xmlns:p="http://schemas.openxmlformats.org/presentationml/2006/main" mc:Ignorable="mv" mc:PreserveAttributes="mv:*" type="twoObj" preserve="1">
   <p:cSld name="Two Content">
     <p:spTree>
       <p:nvGrpSpPr>
@@ -2177,7 +3340,7 @@
             <a:fld id="{E4FB4266-2A1A-4872-824A-34A98499888B}" type="datetimeFigureOut">
               <a:rPr lang="en-US" smtClean="0"/>
               <a:pPr/>
-              <a:t>4/7/2015</a:t>
+              <a:t>4/7/15</a:t>
             </a:fld>
             <a:endParaRPr lang="en-US"/>
           </a:p>
@@ -2229,7 +3392,7 @@
     </p:spTree>
     <p:extLst>
       <p:ext uri="{BB962C8B-B14F-4D97-AF65-F5344CB8AC3E}">
-        <p14:creationId xmlns:p14="http://schemas.microsoft.com/office/powerpoint/2010/main" val="1440735080"/>
+        <p14:creationId xmlns:p14="http://schemas.microsoft.com/office/powerpoint/2010/main" xmlns:p="http://schemas.openxmlformats.org/presentationml/2006/main" xmlns:r="http://schemas.openxmlformats.org/officeDocument/2006/relationships" xmlns:a="http://schemas.openxmlformats.org/drawingml/2006/main" xmlns="" val="1440735080"/>
       </p:ext>
     </p:extLst>
   </p:cSld>
@@ -2240,7 +3403,7 @@
 </file>
 
 <file path=ppt/slideLayouts/slideLayout5.xml><?xml version="1.0" encoding="utf-8"?>
-<p:sldLayout xmlns:a="http://schemas.openxmlformats.org/drawingml/2006/main" xmlns:r="http://schemas.openxmlformats.org/officeDocument/2006/relationships" xmlns:p="http://schemas.openxmlformats.org/presentationml/2006/main" type="twoTxTwoObj" preserve="1">
+<p:sldLayout xmlns:a="http://schemas.openxmlformats.org/drawingml/2006/main" xmlns:r="http://schemas.openxmlformats.org/officeDocument/2006/relationships" xmlns:mc="http://schemas.openxmlformats.org/markup-compatibility/2006" xmlns:mv="urn:schemas-microsoft-com:mac:vml" xmlns:p="http://schemas.openxmlformats.org/presentationml/2006/main" mc:Ignorable="mv" mc:PreserveAttributes="mv:*" type="twoTxTwoObj" preserve="1">
   <p:cSld name="Comparison">
     <p:spTree>
       <p:nvGrpSpPr>
@@ -2601,7 +3764,7 @@
             <a:fld id="{E4FB4266-2A1A-4872-824A-34A98499888B}" type="datetimeFigureOut">
               <a:rPr lang="en-US" smtClean="0"/>
               <a:pPr/>
-              <a:t>4/7/2015</a:t>
+              <a:t>4/7/15</a:t>
             </a:fld>
             <a:endParaRPr lang="en-US"/>
           </a:p>
@@ -2653,7 +3816,7 @@
     </p:spTree>
     <p:extLst>
       <p:ext uri="{BB962C8B-B14F-4D97-AF65-F5344CB8AC3E}">
-        <p14:creationId xmlns:p14="http://schemas.microsoft.com/office/powerpoint/2010/main" val="3495022340"/>
+        <p14:creationId xmlns:p14="http://schemas.microsoft.com/office/powerpoint/2010/main" xmlns:p="http://schemas.openxmlformats.org/presentationml/2006/main" xmlns:r="http://schemas.openxmlformats.org/officeDocument/2006/relationships" xmlns:a="http://schemas.openxmlformats.org/drawingml/2006/main" xmlns="" val="3495022340"/>
       </p:ext>
     </p:extLst>
   </p:cSld>
@@ -2664,7 +3827,7 @@
 </file>
 
 <file path=ppt/slideLayouts/slideLayout6.xml><?xml version="1.0" encoding="utf-8"?>
-<p:sldLayout xmlns:a="http://schemas.openxmlformats.org/drawingml/2006/main" xmlns:r="http://schemas.openxmlformats.org/officeDocument/2006/relationships" xmlns:p="http://schemas.openxmlformats.org/presentationml/2006/main" type="titleOnly" preserve="1">
+<p:sldLayout xmlns:a="http://schemas.openxmlformats.org/drawingml/2006/main" xmlns:r="http://schemas.openxmlformats.org/officeDocument/2006/relationships" xmlns:mc="http://schemas.openxmlformats.org/markup-compatibility/2006" xmlns:mv="urn:schemas-microsoft-com:mac:vml" xmlns:p="http://schemas.openxmlformats.org/presentationml/2006/main" mc:Ignorable="mv" mc:PreserveAttributes="mv:*" type="titleOnly" preserve="1">
   <p:cSld name="Title Only">
     <p:spTree>
       <p:nvGrpSpPr>
@@ -2721,7 +3884,7 @@
             <a:fld id="{E4FB4266-2A1A-4872-824A-34A98499888B}" type="datetimeFigureOut">
               <a:rPr lang="en-US" smtClean="0"/>
               <a:pPr/>
-              <a:t>4/7/2015</a:t>
+              <a:t>4/7/15</a:t>
             </a:fld>
             <a:endParaRPr lang="en-US"/>
           </a:p>
@@ -2773,7 +3936,7 @@
     </p:spTree>
     <p:extLst>
       <p:ext uri="{BB962C8B-B14F-4D97-AF65-F5344CB8AC3E}">
-        <p14:creationId xmlns:p14="http://schemas.microsoft.com/office/powerpoint/2010/main" val="1615391138"/>
+        <p14:creationId xmlns:p14="http://schemas.microsoft.com/office/powerpoint/2010/main" xmlns:p="http://schemas.openxmlformats.org/presentationml/2006/main" xmlns:r="http://schemas.openxmlformats.org/officeDocument/2006/relationships" xmlns:a="http://schemas.openxmlformats.org/drawingml/2006/main" xmlns="" val="1615391138"/>
       </p:ext>
     </p:extLst>
   </p:cSld>
@@ -2784,7 +3947,7 @@
 </file>
 
 <file path=ppt/slideLayouts/slideLayout7.xml><?xml version="1.0" encoding="utf-8"?>
-<p:sldLayout xmlns:a="http://schemas.openxmlformats.org/drawingml/2006/main" xmlns:r="http://schemas.openxmlformats.org/officeDocument/2006/relationships" xmlns:p="http://schemas.openxmlformats.org/presentationml/2006/main" type="blank" preserve="1">
+<p:sldLayout xmlns:a="http://schemas.openxmlformats.org/drawingml/2006/main" xmlns:r="http://schemas.openxmlformats.org/officeDocument/2006/relationships" xmlns:mc="http://schemas.openxmlformats.org/markup-compatibility/2006" xmlns:mv="urn:schemas-microsoft-com:mac:vml" xmlns:p="http://schemas.openxmlformats.org/presentationml/2006/main" mc:Ignorable="mv" mc:PreserveAttributes="mv:*" type="blank" preserve="1">
   <p:cSld name="Blank">
     <p:spTree>
       <p:nvGrpSpPr>
@@ -2818,7 +3981,7 @@
             <a:fld id="{E4FB4266-2A1A-4872-824A-34A98499888B}" type="datetimeFigureOut">
               <a:rPr lang="en-US" smtClean="0"/>
               <a:pPr/>
-              <a:t>4/7/2015</a:t>
+              <a:t>4/7/15</a:t>
             </a:fld>
             <a:endParaRPr lang="en-US"/>
           </a:p>
@@ -2870,7 +4033,7 @@
     </p:spTree>
     <p:extLst>
       <p:ext uri="{BB962C8B-B14F-4D97-AF65-F5344CB8AC3E}">
-        <p14:creationId xmlns:p14="http://schemas.microsoft.com/office/powerpoint/2010/main" val="3860737788"/>
+        <p14:creationId xmlns:p14="http://schemas.microsoft.com/office/powerpoint/2010/main" xmlns:p="http://schemas.openxmlformats.org/presentationml/2006/main" xmlns:r="http://schemas.openxmlformats.org/officeDocument/2006/relationships" xmlns:a="http://schemas.openxmlformats.org/drawingml/2006/main" xmlns="" val="3860737788"/>
       </p:ext>
     </p:extLst>
   </p:cSld>
@@ -2881,7 +4044,7 @@
 </file>
 
 <file path=ppt/slideLayouts/slideLayout8.xml><?xml version="1.0" encoding="utf-8"?>
-<p:sldLayout xmlns:a="http://schemas.openxmlformats.org/drawingml/2006/main" xmlns:r="http://schemas.openxmlformats.org/officeDocument/2006/relationships" xmlns:p="http://schemas.openxmlformats.org/presentationml/2006/main" type="objTx" preserve="1">
+<p:sldLayout xmlns:a="http://schemas.openxmlformats.org/drawingml/2006/main" xmlns:r="http://schemas.openxmlformats.org/officeDocument/2006/relationships" xmlns:mc="http://schemas.openxmlformats.org/markup-compatibility/2006" xmlns:mv="urn:schemas-microsoft-com:mac:vml" xmlns:p="http://schemas.openxmlformats.org/presentationml/2006/main" mc:Ignorable="mv" mc:PreserveAttributes="mv:*" type="objTx" preserve="1">
   <p:cSld name="Content with Caption">
     <p:spTree>
       <p:nvGrpSpPr>
@@ -3097,7 +4260,7 @@
             <a:fld id="{E4FB4266-2A1A-4872-824A-34A98499888B}" type="datetimeFigureOut">
               <a:rPr lang="en-US" smtClean="0"/>
               <a:pPr/>
-              <a:t>4/7/2015</a:t>
+              <a:t>4/7/15</a:t>
             </a:fld>
             <a:endParaRPr lang="en-US"/>
           </a:p>
@@ -3149,7 +4312,7 @@
     </p:spTree>
     <p:extLst>
       <p:ext uri="{BB962C8B-B14F-4D97-AF65-F5344CB8AC3E}">
-        <p14:creationId xmlns:p14="http://schemas.microsoft.com/office/powerpoint/2010/main" val="3439440614"/>
+        <p14:creationId xmlns:p14="http://schemas.microsoft.com/office/powerpoint/2010/main" xmlns:p="http://schemas.openxmlformats.org/presentationml/2006/main" xmlns:r="http://schemas.openxmlformats.org/officeDocument/2006/relationships" xmlns:a="http://schemas.openxmlformats.org/drawingml/2006/main" xmlns="" val="3439440614"/>
       </p:ext>
     </p:extLst>
   </p:cSld>
@@ -3160,7 +4323,7 @@
 </file>
 
 <file path=ppt/slideLayouts/slideLayout9.xml><?xml version="1.0" encoding="utf-8"?>
-<p:sldLayout xmlns:a="http://schemas.openxmlformats.org/drawingml/2006/main" xmlns:r="http://schemas.openxmlformats.org/officeDocument/2006/relationships" xmlns:p="http://schemas.openxmlformats.org/presentationml/2006/main" type="picTx" preserve="1">
+<p:sldLayout xmlns:a="http://schemas.openxmlformats.org/drawingml/2006/main" xmlns:r="http://schemas.openxmlformats.org/officeDocument/2006/relationships" xmlns:mc="http://schemas.openxmlformats.org/markup-compatibility/2006" xmlns:mv="urn:schemas-microsoft-com:mac:vml" xmlns:p="http://schemas.openxmlformats.org/presentationml/2006/main" mc:Ignorable="mv" mc:PreserveAttributes="mv:*" type="picTx" preserve="1">
   <p:cSld name="Picture with Caption">
     <p:spTree>
       <p:nvGrpSpPr>
@@ -3352,7 +4515,7 @@
             <a:fld id="{E4FB4266-2A1A-4872-824A-34A98499888B}" type="datetimeFigureOut">
               <a:rPr lang="en-US" smtClean="0"/>
               <a:pPr/>
-              <a:t>4/7/2015</a:t>
+              <a:t>4/7/15</a:t>
             </a:fld>
             <a:endParaRPr lang="en-US"/>
           </a:p>
@@ -3404,7 +4567,7 @@
     </p:spTree>
     <p:extLst>
       <p:ext uri="{BB962C8B-B14F-4D97-AF65-F5344CB8AC3E}">
-        <p14:creationId xmlns:p14="http://schemas.microsoft.com/office/powerpoint/2010/main" val="378657483"/>
+        <p14:creationId xmlns:p14="http://schemas.microsoft.com/office/powerpoint/2010/main" xmlns:p="http://schemas.openxmlformats.org/presentationml/2006/main" xmlns:r="http://schemas.openxmlformats.org/officeDocument/2006/relationships" xmlns:a="http://schemas.openxmlformats.org/drawingml/2006/main" xmlns="" val="378657483"/>
       </p:ext>
     </p:extLst>
   </p:cSld>
@@ -3415,7 +4578,7 @@
 </file>
 
 <file path=ppt/slideMasters/slideMaster1.xml><?xml version="1.0" encoding="utf-8"?>
-<p:sldMaster xmlns:a="http://schemas.openxmlformats.org/drawingml/2006/main" xmlns:r="http://schemas.openxmlformats.org/officeDocument/2006/relationships" xmlns:p="http://schemas.openxmlformats.org/presentationml/2006/main">
+<p:sldMaster xmlns:a="http://schemas.openxmlformats.org/drawingml/2006/main" xmlns:r="http://schemas.openxmlformats.org/officeDocument/2006/relationships" xmlns:mc="http://schemas.openxmlformats.org/markup-compatibility/2006" xmlns:mv="urn:schemas-microsoft-com:mac:vml" xmlns:p="http://schemas.openxmlformats.org/presentationml/2006/main" mc:Ignorable="mv" mc:PreserveAttributes="mv:*">
   <p:cSld>
     <p:bg>
       <p:bgRef idx="1001">
@@ -3567,7 +4730,7 @@
             <a:fld id="{E4FB4266-2A1A-4872-824A-34A98499888B}" type="datetimeFigureOut">
               <a:rPr lang="en-US" smtClean="0"/>
               <a:pPr/>
-              <a:t>4/7/2015</a:t>
+              <a:t>4/7/15</a:t>
             </a:fld>
             <a:endParaRPr lang="en-US"/>
           </a:p>
@@ -3655,7 +4818,7 @@
     </p:spTree>
     <p:extLst>
       <p:ext uri="{BB962C8B-B14F-4D97-AF65-F5344CB8AC3E}">
-        <p14:creationId xmlns:p14="http://schemas.microsoft.com/office/powerpoint/2010/main" val="529304135"/>
+        <p14:creationId xmlns:p14="http://schemas.microsoft.com/office/powerpoint/2010/main" xmlns:p="http://schemas.openxmlformats.org/presentationml/2006/main" xmlns:r="http://schemas.openxmlformats.org/officeDocument/2006/relationships" xmlns:a="http://schemas.openxmlformats.org/drawingml/2006/main" xmlns="" val="529304135"/>
       </p:ext>
     </p:extLst>
   </p:cSld>
@@ -3927,7 +5090,7 @@
 </file>
 
 <file path=ppt/slides/slide1.xml><?xml version="1.0" encoding="utf-8"?>
-<p:sld xmlns:a="http://schemas.openxmlformats.org/drawingml/2006/main" xmlns:r="http://schemas.openxmlformats.org/officeDocument/2006/relationships" xmlns:p="http://schemas.openxmlformats.org/presentationml/2006/main">
+<p:sld xmlns:a="http://schemas.openxmlformats.org/drawingml/2006/main" xmlns:r="http://schemas.openxmlformats.org/officeDocument/2006/relationships" xmlns:mc="http://schemas.openxmlformats.org/markup-compatibility/2006" xmlns:mv="urn:schemas-microsoft-com:mac:vml" xmlns:p="http://schemas.openxmlformats.org/presentationml/2006/main" mc:Ignorable="mv" mc:PreserveAttributes="mv:*">
   <p:cSld>
     <p:spTree>
       <p:nvGrpSpPr>
@@ -3989,11 +5152,7 @@
           <a:p>
             <a:r>
               <a:rPr lang="en-US" dirty="0" smtClean="0"/>
-              <a:t>Lab session – </a:t>
-            </a:r>
-            <a:r>
-              <a:rPr lang="en-US" dirty="0" smtClean="0"/>
-              <a:t>metadata interfaces</a:t>
+              <a:t>Lab session – metadata interfaces</a:t>
             </a:r>
             <a:endParaRPr lang="en-US" dirty="0"/>
           </a:p>
@@ -4002,18 +5161,25 @@
     </p:spTree>
     <p:extLst>
       <p:ext uri="{BB962C8B-B14F-4D97-AF65-F5344CB8AC3E}">
-        <p14:creationId xmlns:p14="http://schemas.microsoft.com/office/powerpoint/2010/main" val="3793077892"/>
+        <p14:creationId xmlns:p14="http://schemas.microsoft.com/office/powerpoint/2010/main" xmlns:p="http://schemas.openxmlformats.org/presentationml/2006/main" xmlns:r="http://schemas.openxmlformats.org/officeDocument/2006/relationships" xmlns:a="http://schemas.openxmlformats.org/drawingml/2006/main" xmlns="" val="3793077892"/>
       </p:ext>
     </p:extLst>
   </p:cSld>
   <p:clrMapOvr>
     <a:masterClrMapping/>
   </p:clrMapOvr>
+  <p:timing>
+    <p:tnLst>
+      <p:par>
+        <p:cTn id="1" dur="indefinite" restart="never" nodeType="tmRoot"/>
+      </p:par>
+    </p:tnLst>
+  </p:timing>
 </p:sld>
 </file>
 
 <file path=ppt/slides/slide10.xml><?xml version="1.0" encoding="utf-8"?>
-<p:sld xmlns:a="http://schemas.openxmlformats.org/drawingml/2006/main" xmlns:r="http://schemas.openxmlformats.org/officeDocument/2006/relationships" xmlns:p="http://schemas.openxmlformats.org/presentationml/2006/main">
+<p:sld xmlns:a="http://schemas.openxmlformats.org/drawingml/2006/main" xmlns:r="http://schemas.openxmlformats.org/officeDocument/2006/relationships" xmlns:mc="http://schemas.openxmlformats.org/markup-compatibility/2006" xmlns:mv="urn:schemas-microsoft-com:mac:vml" xmlns:p="http://schemas.openxmlformats.org/presentationml/2006/main" mc:Ignorable="mv" mc:PreserveAttributes="mv:*">
   <p:cSld>
     <p:spTree>
       <p:nvGrpSpPr>
@@ -4046,11 +5212,7 @@
           <a:p>
             <a:r>
               <a:rPr lang="en-US" dirty="0" smtClean="0"/>
-              <a:t>Other </a:t>
-            </a:r>
-            <a:r>
-              <a:rPr lang="en-US" dirty="0" smtClean="0"/>
-              <a:t>standards</a:t>
+              <a:t>Other standards</a:t>
             </a:r>
             <a:endParaRPr lang="en-US" dirty="0"/>
           </a:p>
@@ -4091,11 +5253,7 @@
           <a:p>
             <a:r>
               <a:rPr lang="en-US" dirty="0" smtClean="0"/>
-              <a:t>EAD </a:t>
-            </a:r>
-            <a:r>
-              <a:rPr lang="en-US" dirty="0" smtClean="0"/>
-              <a:t>(and its younger sibling, EAC-CPF)</a:t>
+              <a:t>EAD (and its younger sibling, EAC-CPF)</a:t>
             </a:r>
           </a:p>
         </p:txBody>
@@ -4109,7 +5267,7 @@
 </file>
 
 <file path=ppt/slides/slide11.xml><?xml version="1.0" encoding="utf-8"?>
-<p:sld xmlns:a="http://schemas.openxmlformats.org/drawingml/2006/main" xmlns:r="http://schemas.openxmlformats.org/officeDocument/2006/relationships" xmlns:p="http://schemas.openxmlformats.org/presentationml/2006/main">
+<p:sld xmlns:a="http://schemas.openxmlformats.org/drawingml/2006/main" xmlns:r="http://schemas.openxmlformats.org/officeDocument/2006/relationships" xmlns:mc="http://schemas.openxmlformats.org/markup-compatibility/2006" xmlns:mv="urn:schemas-microsoft-com:mac:vml" xmlns:p="http://schemas.openxmlformats.org/presentationml/2006/main" mc:Ignorable="mv" mc:PreserveAttributes="mv:*">
   <p:cSld>
     <p:spTree>
       <p:nvGrpSpPr>
@@ -4186,7 +5344,7 @@
 </file>
 
 <file path=ppt/slides/slide12.xml><?xml version="1.0" encoding="utf-8"?>
-<p:sld xmlns:a="http://schemas.openxmlformats.org/drawingml/2006/main" xmlns:r="http://schemas.openxmlformats.org/officeDocument/2006/relationships" xmlns:p="http://schemas.openxmlformats.org/presentationml/2006/main">
+<p:sld xmlns:a="http://schemas.openxmlformats.org/drawingml/2006/main" xmlns:r="http://schemas.openxmlformats.org/officeDocument/2006/relationships" xmlns:mc="http://schemas.openxmlformats.org/markup-compatibility/2006" xmlns:mv="urn:schemas-microsoft-com:mac:vml" xmlns:p="http://schemas.openxmlformats.org/presentationml/2006/main" mc:Ignorable="mv" mc:PreserveAttributes="mv:*">
   <p:cSld>
     <p:spTree>
       <p:nvGrpSpPr>
@@ -4270,7 +5428,7 @@
 </file>
 
 <file path=ppt/slides/slide13.xml><?xml version="1.0" encoding="utf-8"?>
-<p:sld xmlns:a="http://schemas.openxmlformats.org/drawingml/2006/main" xmlns:r="http://schemas.openxmlformats.org/officeDocument/2006/relationships" xmlns:p="http://schemas.openxmlformats.org/presentationml/2006/main">
+<p:sld xmlns:a="http://schemas.openxmlformats.org/drawingml/2006/main" xmlns:r="http://schemas.openxmlformats.org/officeDocument/2006/relationships" xmlns:mc="http://schemas.openxmlformats.org/markup-compatibility/2006" xmlns:mv="urn:schemas-microsoft-com:mac:vml" xmlns:p="http://schemas.openxmlformats.org/presentationml/2006/main" mc:Ignorable="mv" mc:PreserveAttributes="mv:*">
   <p:cSld>
     <p:spTree>
       <p:nvGrpSpPr>
@@ -4320,10 +5478,10 @@
           </p:nvPr>
         </p:nvPicPr>
         <p:blipFill>
-          <a:blip r:embed="rId2">
+          <a:blip r:embed="rId3">
             <a:extLst>
               <a:ext uri="{28A0092B-C50C-407E-A947-70E740481C1C}">
-                <a14:useLocalDpi xmlns:a14="http://schemas.microsoft.com/office/drawing/2010/main" val="0"/>
+                <a14:useLocalDpi xmlns:a14="http://schemas.microsoft.com/office/drawing/2010/main" xmlns:p="http://schemas.openxmlformats.org/presentationml/2006/main" xmlns:r="http://schemas.openxmlformats.org/officeDocument/2006/relationships" xmlns:a="http://schemas.openxmlformats.org/drawingml/2006/main" xmlns="" val="0"/>
               </a:ext>
             </a:extLst>
           </a:blip>
@@ -4347,7 +5505,7 @@
 </file>
 
 <file path=ppt/slides/slide14.xml><?xml version="1.0" encoding="utf-8"?>
-<p:sld xmlns:a="http://schemas.openxmlformats.org/drawingml/2006/main" xmlns:r="http://schemas.openxmlformats.org/officeDocument/2006/relationships" xmlns:p="http://schemas.openxmlformats.org/presentationml/2006/main">
+<p:sld xmlns:a="http://schemas.openxmlformats.org/drawingml/2006/main" xmlns:r="http://schemas.openxmlformats.org/officeDocument/2006/relationships" xmlns:mc="http://schemas.openxmlformats.org/markup-compatibility/2006" xmlns:mv="urn:schemas-microsoft-com:mac:vml" xmlns:p="http://schemas.openxmlformats.org/presentationml/2006/main" mc:Ignorable="mv" mc:PreserveAttributes="mv:*">
   <p:cSld>
     <p:spTree>
       <p:nvGrpSpPr>
@@ -4424,7 +5582,7 @@
     </p:spTree>
     <p:extLst>
       <p:ext uri="{BB962C8B-B14F-4D97-AF65-F5344CB8AC3E}">
-        <p14:creationId xmlns:p14="http://schemas.microsoft.com/office/powerpoint/2010/main" val="1077951483"/>
+        <p14:creationId xmlns:p14="http://schemas.microsoft.com/office/powerpoint/2010/main" xmlns:p="http://schemas.openxmlformats.org/presentationml/2006/main" xmlns:r="http://schemas.openxmlformats.org/officeDocument/2006/relationships" xmlns:a="http://schemas.openxmlformats.org/drawingml/2006/main" xmlns="" val="1077951483"/>
       </p:ext>
     </p:extLst>
   </p:cSld>
@@ -4435,7 +5593,7 @@
 </file>
 
 <file path=ppt/slides/slide15.xml><?xml version="1.0" encoding="utf-8"?>
-<p:sld xmlns:a="http://schemas.openxmlformats.org/drawingml/2006/main" xmlns:r="http://schemas.openxmlformats.org/officeDocument/2006/relationships" xmlns:p="http://schemas.openxmlformats.org/presentationml/2006/main">
+<p:sld xmlns:a="http://schemas.openxmlformats.org/drawingml/2006/main" xmlns:r="http://schemas.openxmlformats.org/officeDocument/2006/relationships" xmlns:mc="http://schemas.openxmlformats.org/markup-compatibility/2006" xmlns:mv="urn:schemas-microsoft-com:mac:vml" xmlns:p="http://schemas.openxmlformats.org/presentationml/2006/main" mc:Ignorable="mv" mc:PreserveAttributes="mv:*">
   <p:cSld>
     <p:spTree>
       <p:nvGrpSpPr>
@@ -4485,10 +5643,10 @@
           </p:nvPr>
         </p:nvPicPr>
         <p:blipFill>
-          <a:blip r:embed="rId2">
+          <a:blip r:embed="rId3">
             <a:extLst>
               <a:ext uri="{28A0092B-C50C-407E-A947-70E740481C1C}">
-                <a14:useLocalDpi xmlns:a14="http://schemas.microsoft.com/office/drawing/2010/main" val="0"/>
+                <a14:useLocalDpi xmlns:a14="http://schemas.microsoft.com/office/drawing/2010/main" xmlns:p="http://schemas.openxmlformats.org/presentationml/2006/main" xmlns:r="http://schemas.openxmlformats.org/officeDocument/2006/relationships" xmlns:a="http://schemas.openxmlformats.org/drawingml/2006/main" xmlns="" val="0"/>
               </a:ext>
             </a:extLst>
           </a:blip>
@@ -4542,7 +5700,7 @@
 </file>
 
 <file path=ppt/slides/slide16.xml><?xml version="1.0" encoding="utf-8"?>
-<p:sld xmlns:a="http://schemas.openxmlformats.org/drawingml/2006/main" xmlns:r="http://schemas.openxmlformats.org/officeDocument/2006/relationships" xmlns:p="http://schemas.openxmlformats.org/presentationml/2006/main">
+<p:sld xmlns:a="http://schemas.openxmlformats.org/drawingml/2006/main" xmlns:r="http://schemas.openxmlformats.org/officeDocument/2006/relationships" xmlns:mc="http://schemas.openxmlformats.org/markup-compatibility/2006" xmlns:mv="urn:schemas-microsoft-com:mac:vml" xmlns:p="http://schemas.openxmlformats.org/presentationml/2006/main" mc:Ignorable="mv" mc:PreserveAttributes="mv:*">
   <p:cSld>
     <p:spTree>
       <p:nvGrpSpPr>
@@ -4627,7 +5785,7 @@
     </p:spTree>
     <p:extLst>
       <p:ext uri="{BB962C8B-B14F-4D97-AF65-F5344CB8AC3E}">
-        <p14:creationId xmlns:p14="http://schemas.microsoft.com/office/powerpoint/2010/main" val="3178728497"/>
+        <p14:creationId xmlns:p14="http://schemas.microsoft.com/office/powerpoint/2010/main" xmlns:p="http://schemas.openxmlformats.org/presentationml/2006/main" xmlns:r="http://schemas.openxmlformats.org/officeDocument/2006/relationships" xmlns:a="http://schemas.openxmlformats.org/drawingml/2006/main" xmlns="" val="3178728497"/>
       </p:ext>
     </p:extLst>
   </p:cSld>
@@ -4638,7 +5796,7 @@
 </file>
 
 <file path=ppt/slides/slide17.xml><?xml version="1.0" encoding="utf-8"?>
-<p:sld xmlns:a="http://schemas.openxmlformats.org/drawingml/2006/main" xmlns:r="http://schemas.openxmlformats.org/officeDocument/2006/relationships" xmlns:p="http://schemas.openxmlformats.org/presentationml/2006/main">
+<p:sld xmlns:a="http://schemas.openxmlformats.org/drawingml/2006/main" xmlns:r="http://schemas.openxmlformats.org/officeDocument/2006/relationships" xmlns:mc="http://schemas.openxmlformats.org/markup-compatibility/2006" xmlns:mv="urn:schemas-microsoft-com:mac:vml" xmlns:p="http://schemas.openxmlformats.org/presentationml/2006/main" mc:Ignorable="mv" mc:PreserveAttributes="mv:*">
   <p:cSld>
     <p:spTree>
       <p:nvGrpSpPr>
@@ -4715,7 +5873,7 @@
 </file>
 
 <file path=ppt/slides/slide18.xml><?xml version="1.0" encoding="utf-8"?>
-<p:sld xmlns:a="http://schemas.openxmlformats.org/drawingml/2006/main" xmlns:r="http://schemas.openxmlformats.org/officeDocument/2006/relationships" xmlns:p="http://schemas.openxmlformats.org/presentationml/2006/main">
+<p:sld xmlns:a="http://schemas.openxmlformats.org/drawingml/2006/main" xmlns:r="http://schemas.openxmlformats.org/officeDocument/2006/relationships" xmlns:mc="http://schemas.openxmlformats.org/markup-compatibility/2006" xmlns:mv="urn:schemas-microsoft-com:mac:vml" xmlns:p="http://schemas.openxmlformats.org/presentationml/2006/main" mc:Ignorable="mv" mc:PreserveAttributes="mv:*">
   <p:cSld>
     <p:spTree>
       <p:nvGrpSpPr>
@@ -4768,7 +5926,7 @@
           <a:blip r:embed="rId3">
             <a:extLst>
               <a:ext uri="{28A0092B-C50C-407E-A947-70E740481C1C}">
-                <a14:useLocalDpi xmlns:a14="http://schemas.microsoft.com/office/drawing/2010/main" val="0"/>
+                <a14:useLocalDpi xmlns:a14="http://schemas.microsoft.com/office/drawing/2010/main" xmlns:p="http://schemas.openxmlformats.org/presentationml/2006/main" xmlns:r="http://schemas.openxmlformats.org/officeDocument/2006/relationships" xmlns:a="http://schemas.openxmlformats.org/drawingml/2006/main" xmlns="" val="0"/>
               </a:ext>
             </a:extLst>
           </a:blip>
@@ -4786,7 +5944,7 @@
     </p:spTree>
     <p:extLst>
       <p:ext uri="{BB962C8B-B14F-4D97-AF65-F5344CB8AC3E}">
-        <p14:creationId xmlns:p14="http://schemas.microsoft.com/office/powerpoint/2010/main" val="4128866827"/>
+        <p14:creationId xmlns:p14="http://schemas.microsoft.com/office/powerpoint/2010/main" xmlns:p="http://schemas.openxmlformats.org/presentationml/2006/main" xmlns:r="http://schemas.openxmlformats.org/officeDocument/2006/relationships" xmlns:a="http://schemas.openxmlformats.org/drawingml/2006/main" xmlns="" val="4128866827"/>
       </p:ext>
     </p:extLst>
   </p:cSld>
@@ -4797,7 +5955,7 @@
 </file>
 
 <file path=ppt/slides/slide19.xml><?xml version="1.0" encoding="utf-8"?>
-<p:sld xmlns:a="http://schemas.openxmlformats.org/drawingml/2006/main" xmlns:r="http://schemas.openxmlformats.org/officeDocument/2006/relationships" xmlns:p="http://schemas.openxmlformats.org/presentationml/2006/main">
+<p:sld xmlns:a="http://schemas.openxmlformats.org/drawingml/2006/main" xmlns:r="http://schemas.openxmlformats.org/officeDocument/2006/relationships" xmlns:mc="http://schemas.openxmlformats.org/markup-compatibility/2006" xmlns:mv="urn:schemas-microsoft-com:mac:vml" xmlns:p="http://schemas.openxmlformats.org/presentationml/2006/main" mc:Ignorable="mv" mc:PreserveAttributes="mv:*">
   <p:cSld>
     <p:spTree>
       <p:nvGrpSpPr>
@@ -4850,7 +6008,7 @@
           <a:blip r:embed="rId3">
             <a:extLst>
               <a:ext uri="{28A0092B-C50C-407E-A947-70E740481C1C}">
-                <a14:useLocalDpi xmlns:a14="http://schemas.microsoft.com/office/drawing/2010/main" val="0"/>
+                <a14:useLocalDpi xmlns:a14="http://schemas.microsoft.com/office/drawing/2010/main" xmlns:p="http://schemas.openxmlformats.org/presentationml/2006/main" xmlns:r="http://schemas.openxmlformats.org/officeDocument/2006/relationships" xmlns:a="http://schemas.openxmlformats.org/drawingml/2006/main" xmlns="" val="0"/>
               </a:ext>
             </a:extLst>
           </a:blip>
@@ -4868,7 +6026,7 @@
     </p:spTree>
     <p:extLst>
       <p:ext uri="{BB962C8B-B14F-4D97-AF65-F5344CB8AC3E}">
-        <p14:creationId xmlns:p14="http://schemas.microsoft.com/office/powerpoint/2010/main" val="4106516689"/>
+        <p14:creationId xmlns:p14="http://schemas.microsoft.com/office/powerpoint/2010/main" xmlns:p="http://schemas.openxmlformats.org/presentationml/2006/main" xmlns:r="http://schemas.openxmlformats.org/officeDocument/2006/relationships" xmlns:a="http://schemas.openxmlformats.org/drawingml/2006/main" xmlns="" val="4106516689"/>
       </p:ext>
     </p:extLst>
   </p:cSld>
@@ -4879,7 +6037,7 @@
 </file>
 
 <file path=ppt/slides/slide2.xml><?xml version="1.0" encoding="utf-8"?>
-<p:sld xmlns:a="http://schemas.openxmlformats.org/drawingml/2006/main" xmlns:r="http://schemas.openxmlformats.org/officeDocument/2006/relationships" xmlns:p="http://schemas.openxmlformats.org/presentationml/2006/main">
+<p:sld xmlns:a="http://schemas.openxmlformats.org/drawingml/2006/main" xmlns:r="http://schemas.openxmlformats.org/officeDocument/2006/relationships" xmlns:mc="http://schemas.openxmlformats.org/markup-compatibility/2006" xmlns:mv="urn:schemas-microsoft-com:mac:vml" xmlns:p="http://schemas.openxmlformats.org/presentationml/2006/main" mc:Ignorable="mv" mc:PreserveAttributes="mv:*">
   <p:cSld>
     <p:spTree>
       <p:nvGrpSpPr>
@@ -4956,18 +6114,25 @@
     </p:spTree>
     <p:extLst>
       <p:ext uri="{BB962C8B-B14F-4D97-AF65-F5344CB8AC3E}">
-        <p14:creationId xmlns:p14="http://schemas.microsoft.com/office/powerpoint/2010/main" val="366304309"/>
+        <p14:creationId xmlns:p14="http://schemas.microsoft.com/office/powerpoint/2010/main" xmlns:p="http://schemas.openxmlformats.org/presentationml/2006/main" xmlns:r="http://schemas.openxmlformats.org/officeDocument/2006/relationships" xmlns:a="http://schemas.openxmlformats.org/drawingml/2006/main" xmlns="" val="366304309"/>
       </p:ext>
     </p:extLst>
   </p:cSld>
   <p:clrMapOvr>
     <a:masterClrMapping/>
   </p:clrMapOvr>
+  <p:timing>
+    <p:tnLst>
+      <p:par>
+        <p:cTn id="1" dur="indefinite" restart="never" nodeType="tmRoot"/>
+      </p:par>
+    </p:tnLst>
+  </p:timing>
 </p:sld>
 </file>
 
 <file path=ppt/slides/slide20.xml><?xml version="1.0" encoding="utf-8"?>
-<p:sld xmlns:a="http://schemas.openxmlformats.org/drawingml/2006/main" xmlns:r="http://schemas.openxmlformats.org/officeDocument/2006/relationships" xmlns:p="http://schemas.openxmlformats.org/presentationml/2006/main">
+<p:sld xmlns:a="http://schemas.openxmlformats.org/drawingml/2006/main" xmlns:r="http://schemas.openxmlformats.org/officeDocument/2006/relationships" xmlns:mc="http://schemas.openxmlformats.org/markup-compatibility/2006" xmlns:mv="urn:schemas-microsoft-com:mac:vml" xmlns:p="http://schemas.openxmlformats.org/presentationml/2006/main" mc:Ignorable="mv" mc:PreserveAttributes="mv:*">
   <p:cSld>
     <p:spTree>
       <p:nvGrpSpPr>
@@ -5020,7 +6185,7 @@
           <a:blip r:embed="rId3">
             <a:extLst>
               <a:ext uri="{28A0092B-C50C-407E-A947-70E740481C1C}">
-                <a14:useLocalDpi xmlns:a14="http://schemas.microsoft.com/office/drawing/2010/main" val="0"/>
+                <a14:useLocalDpi xmlns:a14="http://schemas.microsoft.com/office/drawing/2010/main" xmlns:p="http://schemas.openxmlformats.org/presentationml/2006/main" xmlns:r="http://schemas.openxmlformats.org/officeDocument/2006/relationships" xmlns:a="http://schemas.openxmlformats.org/drawingml/2006/main" xmlns="" val="0"/>
               </a:ext>
             </a:extLst>
           </a:blip>
@@ -5038,7 +6203,7 @@
     </p:spTree>
     <p:extLst>
       <p:ext uri="{BB962C8B-B14F-4D97-AF65-F5344CB8AC3E}">
-        <p14:creationId xmlns:p14="http://schemas.microsoft.com/office/powerpoint/2010/main" val="278433066"/>
+        <p14:creationId xmlns:p14="http://schemas.microsoft.com/office/powerpoint/2010/main" xmlns:p="http://schemas.openxmlformats.org/presentationml/2006/main" xmlns:r="http://schemas.openxmlformats.org/officeDocument/2006/relationships" xmlns:a="http://schemas.openxmlformats.org/drawingml/2006/main" xmlns="" val="278433066"/>
       </p:ext>
     </p:extLst>
   </p:cSld>
@@ -5049,7 +6214,7 @@
 </file>
 
 <file path=ppt/slides/slide21.xml><?xml version="1.0" encoding="utf-8"?>
-<p:sld xmlns:a="http://schemas.openxmlformats.org/drawingml/2006/main" xmlns:r="http://schemas.openxmlformats.org/officeDocument/2006/relationships" xmlns:p="http://schemas.openxmlformats.org/presentationml/2006/main">
+<p:sld xmlns:a="http://schemas.openxmlformats.org/drawingml/2006/main" xmlns:r="http://schemas.openxmlformats.org/officeDocument/2006/relationships" xmlns:mc="http://schemas.openxmlformats.org/markup-compatibility/2006" xmlns:mv="urn:schemas-microsoft-com:mac:vml" xmlns:p="http://schemas.openxmlformats.org/presentationml/2006/main" mc:Ignorable="mv" mc:PreserveAttributes="mv:*">
   <p:cSld>
     <p:spTree>
       <p:nvGrpSpPr>
@@ -5140,7 +6305,7 @@
 </file>
 
 <file path=ppt/slides/slide22.xml><?xml version="1.0" encoding="utf-8"?>
-<p:sld xmlns:a="http://schemas.openxmlformats.org/drawingml/2006/main" xmlns:r="http://schemas.openxmlformats.org/officeDocument/2006/relationships" xmlns:p="http://schemas.openxmlformats.org/presentationml/2006/main">
+<p:sld xmlns:a="http://schemas.openxmlformats.org/drawingml/2006/main" xmlns:r="http://schemas.openxmlformats.org/officeDocument/2006/relationships" xmlns:mc="http://schemas.openxmlformats.org/markup-compatibility/2006" xmlns:mv="urn:schemas-microsoft-com:mac:vml" xmlns:p="http://schemas.openxmlformats.org/presentationml/2006/main" mc:Ignorable="mv" mc:PreserveAttributes="mv:*">
   <p:cSld>
     <p:spTree>
       <p:nvGrpSpPr>
@@ -5193,7 +6358,7 @@
           <a:blip r:embed="rId2">
             <a:extLst>
               <a:ext uri="{28A0092B-C50C-407E-A947-70E740481C1C}">
-                <a14:useLocalDpi xmlns:a14="http://schemas.microsoft.com/office/drawing/2010/main" val="0"/>
+                <a14:useLocalDpi xmlns:a14="http://schemas.microsoft.com/office/drawing/2010/main" xmlns:p="http://schemas.openxmlformats.org/presentationml/2006/main" xmlns:r="http://schemas.openxmlformats.org/officeDocument/2006/relationships" xmlns:a="http://schemas.openxmlformats.org/drawingml/2006/main" xmlns="" val="0"/>
               </a:ext>
             </a:extLst>
           </a:blip>
@@ -5211,7 +6376,7 @@
     </p:spTree>
     <p:extLst>
       <p:ext uri="{BB962C8B-B14F-4D97-AF65-F5344CB8AC3E}">
-        <p14:creationId xmlns:p14="http://schemas.microsoft.com/office/powerpoint/2010/main" val="2143967194"/>
+        <p14:creationId xmlns:p14="http://schemas.microsoft.com/office/powerpoint/2010/main" xmlns:p="http://schemas.openxmlformats.org/presentationml/2006/main" xmlns:r="http://schemas.openxmlformats.org/officeDocument/2006/relationships" xmlns:a="http://schemas.openxmlformats.org/drawingml/2006/main" xmlns="" val="2143967194"/>
       </p:ext>
     </p:extLst>
   </p:cSld>
@@ -5222,7 +6387,7 @@
 </file>
 
 <file path=ppt/slides/slide23.xml><?xml version="1.0" encoding="utf-8"?>
-<p:sld xmlns:a="http://schemas.openxmlformats.org/drawingml/2006/main" xmlns:r="http://schemas.openxmlformats.org/officeDocument/2006/relationships" xmlns:p="http://schemas.openxmlformats.org/presentationml/2006/main">
+<p:sld xmlns:a="http://schemas.openxmlformats.org/drawingml/2006/main" xmlns:r="http://schemas.openxmlformats.org/officeDocument/2006/relationships" xmlns:mc="http://schemas.openxmlformats.org/markup-compatibility/2006" xmlns:mv="urn:schemas-microsoft-com:mac:vml" xmlns:p="http://schemas.openxmlformats.org/presentationml/2006/main" mc:Ignorable="mv" mc:PreserveAttributes="mv:*">
   <p:cSld>
     <p:spTree>
       <p:nvGrpSpPr>
@@ -5305,7 +6470,7 @@
 </file>
 
 <file path=ppt/slides/slide24.xml><?xml version="1.0" encoding="utf-8"?>
-<p:sld xmlns:a="http://schemas.openxmlformats.org/drawingml/2006/main" xmlns:r="http://schemas.openxmlformats.org/officeDocument/2006/relationships" xmlns:p="http://schemas.openxmlformats.org/presentationml/2006/main">
+<p:sld xmlns:a="http://schemas.openxmlformats.org/drawingml/2006/main" xmlns:r="http://schemas.openxmlformats.org/officeDocument/2006/relationships" xmlns:mc="http://schemas.openxmlformats.org/markup-compatibility/2006" xmlns:mv="urn:schemas-microsoft-com:mac:vml" xmlns:p="http://schemas.openxmlformats.org/presentationml/2006/main" mc:Ignorable="mv" mc:PreserveAttributes="mv:*">
   <p:cSld>
     <p:spTree>
       <p:nvGrpSpPr>
@@ -5388,7 +6553,7 @@
 </file>
 
 <file path=ppt/slides/slide25.xml><?xml version="1.0" encoding="utf-8"?>
-<p:sld xmlns:a="http://schemas.openxmlformats.org/drawingml/2006/main" xmlns:r="http://schemas.openxmlformats.org/officeDocument/2006/relationships" xmlns:p="http://schemas.openxmlformats.org/presentationml/2006/main">
+<p:sld xmlns:a="http://schemas.openxmlformats.org/drawingml/2006/main" xmlns:r="http://schemas.openxmlformats.org/officeDocument/2006/relationships" xmlns:mc="http://schemas.openxmlformats.org/markup-compatibility/2006" xmlns:mv="urn:schemas-microsoft-com:mac:vml" xmlns:p="http://schemas.openxmlformats.org/presentationml/2006/main" mc:Ignorable="mv" mc:PreserveAttributes="mv:*">
   <p:cSld>
     <p:spTree>
       <p:nvGrpSpPr>
@@ -5471,7 +6636,7 @@
 </file>
 
 <file path=ppt/slides/slide26.xml><?xml version="1.0" encoding="utf-8"?>
-<p:sld xmlns:a="http://schemas.openxmlformats.org/drawingml/2006/main" xmlns:r="http://schemas.openxmlformats.org/officeDocument/2006/relationships" xmlns:p="http://schemas.openxmlformats.org/presentationml/2006/main">
+<p:sld xmlns:a="http://schemas.openxmlformats.org/drawingml/2006/main" xmlns:r="http://schemas.openxmlformats.org/officeDocument/2006/relationships" xmlns:mc="http://schemas.openxmlformats.org/markup-compatibility/2006" xmlns:mv="urn:schemas-microsoft-com:mac:vml" xmlns:p="http://schemas.openxmlformats.org/presentationml/2006/main" mc:Ignorable="mv" mc:PreserveAttributes="mv:*">
   <p:cSld>
     <p:spTree>
       <p:nvGrpSpPr>
@@ -5558,7 +6723,7 @@
     </p:spTree>
     <p:extLst>
       <p:ext uri="{BB962C8B-B14F-4D97-AF65-F5344CB8AC3E}">
-        <p14:creationId xmlns:p14="http://schemas.microsoft.com/office/powerpoint/2010/main" val="2603635560"/>
+        <p14:creationId xmlns:p14="http://schemas.microsoft.com/office/powerpoint/2010/main" xmlns:p="http://schemas.openxmlformats.org/presentationml/2006/main" xmlns:r="http://schemas.openxmlformats.org/officeDocument/2006/relationships" xmlns:a="http://schemas.openxmlformats.org/drawingml/2006/main" xmlns="" val="2603635560"/>
       </p:ext>
     </p:extLst>
   </p:cSld>
@@ -5569,7 +6734,7 @@
 </file>
 
 <file path=ppt/slides/slide27.xml><?xml version="1.0" encoding="utf-8"?>
-<p:sld xmlns:a="http://schemas.openxmlformats.org/drawingml/2006/main" xmlns:r="http://schemas.openxmlformats.org/officeDocument/2006/relationships" xmlns:p="http://schemas.openxmlformats.org/presentationml/2006/main">
+<p:sld xmlns:a="http://schemas.openxmlformats.org/drawingml/2006/main" xmlns:r="http://schemas.openxmlformats.org/officeDocument/2006/relationships" xmlns:mc="http://schemas.openxmlformats.org/markup-compatibility/2006" xmlns:mv="urn:schemas-microsoft-com:mac:vml" xmlns:p="http://schemas.openxmlformats.org/presentationml/2006/main" mc:Ignorable="mv" mc:PreserveAttributes="mv:*">
   <p:cSld>
     <p:spTree>
       <p:nvGrpSpPr>
@@ -5646,7 +6811,7 @@
 </file>
 
 <file path=ppt/slides/slide28.xml><?xml version="1.0" encoding="utf-8"?>
-<p:sld xmlns:a="http://schemas.openxmlformats.org/drawingml/2006/main" xmlns:r="http://schemas.openxmlformats.org/officeDocument/2006/relationships" xmlns:p="http://schemas.openxmlformats.org/presentationml/2006/main">
+<p:sld xmlns:a="http://schemas.openxmlformats.org/drawingml/2006/main" xmlns:r="http://schemas.openxmlformats.org/officeDocument/2006/relationships" xmlns:mc="http://schemas.openxmlformats.org/markup-compatibility/2006" xmlns:mv="urn:schemas-microsoft-com:mac:vml" xmlns:p="http://schemas.openxmlformats.org/presentationml/2006/main" mc:Ignorable="mv" mc:PreserveAttributes="mv:*">
   <p:cSld>
     <p:spTree>
       <p:nvGrpSpPr>
@@ -5696,10 +6861,10 @@
           </p:nvPr>
         </p:nvPicPr>
         <p:blipFill>
-          <a:blip r:embed="rId2">
+          <a:blip r:embed="rId3">
             <a:extLst>
               <a:ext uri="{28A0092B-C50C-407E-A947-70E740481C1C}">
-                <a14:useLocalDpi xmlns:a14="http://schemas.microsoft.com/office/drawing/2010/main" val="0"/>
+                <a14:useLocalDpi xmlns:a14="http://schemas.microsoft.com/office/drawing/2010/main" xmlns:p="http://schemas.openxmlformats.org/presentationml/2006/main" xmlns:r="http://schemas.openxmlformats.org/officeDocument/2006/relationships" xmlns:a="http://schemas.openxmlformats.org/drawingml/2006/main" xmlns="" val="0"/>
               </a:ext>
             </a:extLst>
           </a:blip>
@@ -5723,7 +6888,7 @@
 </file>
 
 <file path=ppt/slides/slide29.xml><?xml version="1.0" encoding="utf-8"?>
-<p:sld xmlns:a="http://schemas.openxmlformats.org/drawingml/2006/main" xmlns:r="http://schemas.openxmlformats.org/officeDocument/2006/relationships" xmlns:p="http://schemas.openxmlformats.org/presentationml/2006/main">
+<p:sld xmlns:a="http://schemas.openxmlformats.org/drawingml/2006/main" xmlns:r="http://schemas.openxmlformats.org/officeDocument/2006/relationships" xmlns:mc="http://schemas.openxmlformats.org/markup-compatibility/2006" xmlns:mv="urn:schemas-microsoft-com:mac:vml" xmlns:p="http://schemas.openxmlformats.org/presentationml/2006/main" mc:Ignorable="mv" mc:PreserveAttributes="mv:*">
   <p:cSld>
     <p:spTree>
       <p:nvGrpSpPr>
@@ -5800,7 +6965,7 @@
 </file>
 
 <file path=ppt/slides/slide3.xml><?xml version="1.0" encoding="utf-8"?>
-<p:sld xmlns:a="http://schemas.openxmlformats.org/drawingml/2006/main" xmlns:r="http://schemas.openxmlformats.org/officeDocument/2006/relationships" xmlns:p="http://schemas.openxmlformats.org/presentationml/2006/main">
+<p:sld xmlns:a="http://schemas.openxmlformats.org/drawingml/2006/main" xmlns:r="http://schemas.openxmlformats.org/officeDocument/2006/relationships" xmlns:mc="http://schemas.openxmlformats.org/markup-compatibility/2006" xmlns:mv="urn:schemas-microsoft-com:mac:vml" xmlns:p="http://schemas.openxmlformats.org/presentationml/2006/main" mc:Ignorable="mv" mc:PreserveAttributes="mv:*">
   <p:cSld>
     <p:spTree>
       <p:nvGrpSpPr>
@@ -5868,18 +7033,25 @@
     </p:spTree>
     <p:extLst>
       <p:ext uri="{BB962C8B-B14F-4D97-AF65-F5344CB8AC3E}">
-        <p14:creationId xmlns:p14="http://schemas.microsoft.com/office/powerpoint/2010/main" val="1438403741"/>
+        <p14:creationId xmlns:p14="http://schemas.microsoft.com/office/powerpoint/2010/main" xmlns:p="http://schemas.openxmlformats.org/presentationml/2006/main" xmlns:r="http://schemas.openxmlformats.org/officeDocument/2006/relationships" xmlns:a="http://schemas.openxmlformats.org/drawingml/2006/main" xmlns="" val="1438403741"/>
       </p:ext>
     </p:extLst>
   </p:cSld>
   <p:clrMapOvr>
     <a:masterClrMapping/>
   </p:clrMapOvr>
+  <p:timing>
+    <p:tnLst>
+      <p:par>
+        <p:cTn id="1" dur="indefinite" restart="never" nodeType="tmRoot"/>
+      </p:par>
+    </p:tnLst>
+  </p:timing>
 </p:sld>
 </file>
 
 <file path=ppt/slides/slide30.xml><?xml version="1.0" encoding="utf-8"?>
-<p:sld xmlns:a="http://schemas.openxmlformats.org/drawingml/2006/main" xmlns:r="http://schemas.openxmlformats.org/officeDocument/2006/relationships" xmlns:p="http://schemas.openxmlformats.org/presentationml/2006/main">
+<p:sld xmlns:a="http://schemas.openxmlformats.org/drawingml/2006/main" xmlns:r="http://schemas.openxmlformats.org/officeDocument/2006/relationships" xmlns:mc="http://schemas.openxmlformats.org/markup-compatibility/2006" xmlns:mv="urn:schemas-microsoft-com:mac:vml" xmlns:p="http://schemas.openxmlformats.org/presentationml/2006/main" mc:Ignorable="mv" mc:PreserveAttributes="mv:*">
   <p:cSld>
     <p:spTree>
       <p:nvGrpSpPr>
@@ -5932,7 +7104,7 @@
           <a:blip r:embed="rId3">
             <a:extLst>
               <a:ext uri="{28A0092B-C50C-407E-A947-70E740481C1C}">
-                <a14:useLocalDpi xmlns:a14="http://schemas.microsoft.com/office/drawing/2010/main" val="0"/>
+                <a14:useLocalDpi xmlns:a14="http://schemas.microsoft.com/office/drawing/2010/main" xmlns:p="http://schemas.openxmlformats.org/presentationml/2006/main" xmlns:r="http://schemas.openxmlformats.org/officeDocument/2006/relationships" xmlns:a="http://schemas.openxmlformats.org/drawingml/2006/main" xmlns="" val="0"/>
               </a:ext>
             </a:extLst>
           </a:blip>
@@ -5950,7 +7122,7 @@
     </p:spTree>
     <p:extLst>
       <p:ext uri="{BB962C8B-B14F-4D97-AF65-F5344CB8AC3E}">
-        <p14:creationId xmlns:p14="http://schemas.microsoft.com/office/powerpoint/2010/main" val="2058714289"/>
+        <p14:creationId xmlns:p14="http://schemas.microsoft.com/office/powerpoint/2010/main" xmlns:p="http://schemas.openxmlformats.org/presentationml/2006/main" xmlns:r="http://schemas.openxmlformats.org/officeDocument/2006/relationships" xmlns:a="http://schemas.openxmlformats.org/drawingml/2006/main" xmlns="" val="2058714289"/>
       </p:ext>
     </p:extLst>
   </p:cSld>
@@ -5961,7 +7133,7 @@
 </file>
 
 <file path=ppt/slides/slide31.xml><?xml version="1.0" encoding="utf-8"?>
-<p:sld xmlns:a="http://schemas.openxmlformats.org/drawingml/2006/main" xmlns:r="http://schemas.openxmlformats.org/officeDocument/2006/relationships" xmlns:p="http://schemas.openxmlformats.org/presentationml/2006/main">
+<p:sld xmlns:a="http://schemas.openxmlformats.org/drawingml/2006/main" xmlns:r="http://schemas.openxmlformats.org/officeDocument/2006/relationships" xmlns:mc="http://schemas.openxmlformats.org/markup-compatibility/2006" xmlns:mv="urn:schemas-microsoft-com:mac:vml" xmlns:p="http://schemas.openxmlformats.org/presentationml/2006/main" mc:Ignorable="mv" mc:PreserveAttributes="mv:*">
   <p:cSld>
     <p:spTree>
       <p:nvGrpSpPr>
@@ -6032,7 +7204,7 @@
 </file>
 
 <file path=ppt/slides/slide32.xml><?xml version="1.0" encoding="utf-8"?>
-<p:sld xmlns:a="http://schemas.openxmlformats.org/drawingml/2006/main" xmlns:r="http://schemas.openxmlformats.org/officeDocument/2006/relationships" xmlns:p="http://schemas.openxmlformats.org/presentationml/2006/main">
+<p:sld xmlns:a="http://schemas.openxmlformats.org/drawingml/2006/main" xmlns:r="http://schemas.openxmlformats.org/officeDocument/2006/relationships" xmlns:mc="http://schemas.openxmlformats.org/markup-compatibility/2006" xmlns:mv="urn:schemas-microsoft-com:mac:vml" xmlns:p="http://schemas.openxmlformats.org/presentationml/2006/main" mc:Ignorable="mv" mc:PreserveAttributes="mv:*">
   <p:cSld>
     <p:spTree>
       <p:nvGrpSpPr>
@@ -6065,7 +7237,7 @@
           <a:p>
             <a:r>
               <a:rPr lang="en-US" dirty="0" smtClean="0"/>
-              <a:t>Lab</a:t>
+              <a:t>Lab Report #3</a:t>
             </a:r>
             <a:endParaRPr lang="en-US" dirty="0"/>
           </a:p>
@@ -6103,7 +7275,7 @@
     </p:spTree>
     <p:extLst>
       <p:ext uri="{BB962C8B-B14F-4D97-AF65-F5344CB8AC3E}">
-        <p14:creationId xmlns:p14="http://schemas.microsoft.com/office/powerpoint/2010/main" val="1003137175"/>
+        <p14:creationId xmlns:p14="http://schemas.microsoft.com/office/powerpoint/2010/main" xmlns:p="http://schemas.openxmlformats.org/presentationml/2006/main" xmlns:r="http://schemas.openxmlformats.org/officeDocument/2006/relationships" xmlns:a="http://schemas.openxmlformats.org/drawingml/2006/main" xmlns="" val="1003137175"/>
       </p:ext>
     </p:extLst>
   </p:cSld>
@@ -6113,8 +7285,8 @@
 </p:sld>
 </file>
 
-<file path=ppt/slides/slide4.xml><?xml version="1.0" encoding="utf-8"?>
-<p:sld xmlns:a="http://schemas.openxmlformats.org/drawingml/2006/main" xmlns:r="http://schemas.openxmlformats.org/officeDocument/2006/relationships" xmlns:p="http://schemas.openxmlformats.org/presentationml/2006/main">
+<file path=ppt/slides/slide33.xml><?xml version="1.0" encoding="utf-8"?>
+<p:sld xmlns:a="http://schemas.openxmlformats.org/drawingml/2006/main" xmlns:r="http://schemas.openxmlformats.org/officeDocument/2006/relationships" xmlns:mc="http://schemas.openxmlformats.org/markup-compatibility/2006" xmlns:mv="urn:schemas-microsoft-com:mac:vml" xmlns:p="http://schemas.openxmlformats.org/presentationml/2006/main" mc:Ignorable="mv" mc:PreserveAttributes="mv:*">
   <p:cSld>
     <p:spTree>
       <p:nvGrpSpPr>
@@ -6132,6 +7304,29 @@
       </p:grpSpPr>
       <p:sp>
         <p:nvSpPr>
+          <p:cNvPr id="2" name="Title 1"/>
+          <p:cNvSpPr>
+            <a:spLocks noGrp="1"/>
+          </p:cNvSpPr>
+          <p:nvPr>
+            <p:ph type="title"/>
+          </p:nvPr>
+        </p:nvSpPr>
+        <p:spPr/>
+        <p:txBody>
+          <a:bodyPr/>
+          <a:lstStyle/>
+          <a:p>
+            <a:r>
+              <a:rPr lang="en-US" dirty="0" smtClean="0"/>
+              <a:t>Assignment #2</a:t>
+            </a:r>
+            <a:endParaRPr lang="en-US" dirty="0"/>
+          </a:p>
+        </p:txBody>
+      </p:sp>
+      <p:sp>
+        <p:nvSpPr>
           <p:cNvPr id="3" name="Content Placeholder 2"/>
           <p:cNvSpPr>
             <a:spLocks noGrp="1"/>
@@ -6140,33 +7335,34 @@
             <p:ph idx="1"/>
           </p:nvPr>
         </p:nvSpPr>
-        <p:spPr>
-          <a:xfrm>
-            <a:off x="457200" y="457200"/>
-            <a:ext cx="8229600" cy="5668963"/>
-          </a:xfrm>
-        </p:spPr>
-        <p:txBody>
-          <a:bodyPr/>
-          <a:lstStyle/>
-          <a:p>
-            <a:r>
-              <a:rPr lang="en-US" dirty="0" smtClean="0"/>
-              <a:t>&lt;relation&gt;:</a:t>
-            </a:r>
-          </a:p>
-          <a:p>
-            <a:pPr lvl="1"/>
-            <a:r>
-              <a:rPr lang="en-US" dirty="0" smtClean="0"/>
-              <a:t>Relation to what?</a:t>
-            </a:r>
-          </a:p>
-          <a:p>
-            <a:pPr lvl="1"/>
-            <a:r>
-              <a:rPr lang="en-US" dirty="0" smtClean="0"/>
-              <a:t>How can I tell the difference if there’s more than one?</a:t>
+        <p:spPr/>
+        <p:txBody>
+          <a:bodyPr>
+            <a:normAutofit lnSpcReduction="10000"/>
+          </a:bodyPr>
+          <a:lstStyle/>
+          <a:p>
+            <a:r>
+              <a:rPr lang="en-US" dirty="0" smtClean="0"/>
+              <a:t>Compare at least two metadata standards in the context of the collection for which you plan to create metadata</a:t>
+            </a:r>
+          </a:p>
+          <a:p>
+            <a:r>
+              <a:rPr lang="en-US" dirty="0" smtClean="0"/>
+              <a:t>Explain why you are selecting one standard or another, or mixing elements from each, based on the content of your collection and the uses you expect</a:t>
+            </a:r>
+          </a:p>
+          <a:p>
+            <a:r>
+              <a:rPr lang="en-US" dirty="0" smtClean="0"/>
+              <a:t>2-3 pages</a:t>
+            </a:r>
+          </a:p>
+          <a:p>
+            <a:r>
+              <a:rPr lang="en-US" dirty="0" smtClean="0"/>
+              <a:t>Due next Tuesday at midnight</a:t>
             </a:r>
             <a:endParaRPr lang="en-US" dirty="0"/>
           </a:p>
@@ -6175,7 +7371,7 @@
     </p:spTree>
     <p:extLst>
       <p:ext uri="{BB962C8B-B14F-4D97-AF65-F5344CB8AC3E}">
-        <p14:creationId xmlns:p14="http://schemas.microsoft.com/office/powerpoint/2010/main" val="575474191"/>
+        <p14:creationId xmlns:p14="http://schemas.microsoft.com/office/powerpoint/2010/main" xmlns:p="http://schemas.openxmlformats.org/presentationml/2006/main" xmlns:r="http://schemas.openxmlformats.org/officeDocument/2006/relationships" xmlns:a="http://schemas.openxmlformats.org/drawingml/2006/main" xmlns="" val="2328485459"/>
       </p:ext>
     </p:extLst>
   </p:cSld>
@@ -6185,8 +7381,8 @@
 </p:sld>
 </file>
 
-<file path=ppt/slides/slide5.xml><?xml version="1.0" encoding="utf-8"?>
-<p:sld xmlns:a="http://schemas.openxmlformats.org/drawingml/2006/main" xmlns:r="http://schemas.openxmlformats.org/officeDocument/2006/relationships" xmlns:p="http://schemas.openxmlformats.org/presentationml/2006/main">
+<file path=ppt/slides/slide4.xml><?xml version="1.0" encoding="utf-8"?>
+<p:sld xmlns:a="http://schemas.openxmlformats.org/drawingml/2006/main" xmlns:r="http://schemas.openxmlformats.org/officeDocument/2006/relationships" xmlns:mc="http://schemas.openxmlformats.org/markup-compatibility/2006" xmlns:mv="urn:schemas-microsoft-com:mac:vml" xmlns:p="http://schemas.openxmlformats.org/presentationml/2006/main" mc:Ignorable="mv" mc:PreserveAttributes="mv:*">
   <p:cSld>
     <p:spTree>
       <p:nvGrpSpPr>
@@ -6224,14 +7420,21 @@
           <a:p>
             <a:r>
               <a:rPr lang="en-US" dirty="0" smtClean="0"/>
-              <a:t>&lt;coverage&gt;:</a:t>
+              <a:t>&lt;relation&gt;:</a:t>
             </a:r>
           </a:p>
           <a:p>
             <a:pPr lvl="1"/>
             <a:r>
               <a:rPr lang="en-US" dirty="0" smtClean="0"/>
-              <a:t>What does this field mean?</a:t>
+              <a:t>Relation to what?</a:t>
+            </a:r>
+          </a:p>
+          <a:p>
+            <a:pPr lvl="1"/>
+            <a:r>
+              <a:rPr lang="en-US" dirty="0" smtClean="0"/>
+              <a:t>How can I tell the difference if there’s more than one?</a:t>
             </a:r>
             <a:endParaRPr lang="en-US" dirty="0"/>
           </a:p>
@@ -6240,7 +7443,7 @@
     </p:spTree>
     <p:extLst>
       <p:ext uri="{BB962C8B-B14F-4D97-AF65-F5344CB8AC3E}">
-        <p14:creationId xmlns:p14="http://schemas.microsoft.com/office/powerpoint/2010/main" val="4050951280"/>
+        <p14:creationId xmlns:p14="http://schemas.microsoft.com/office/powerpoint/2010/main" xmlns:p="http://schemas.openxmlformats.org/presentationml/2006/main" xmlns:r="http://schemas.openxmlformats.org/officeDocument/2006/relationships" xmlns:a="http://schemas.openxmlformats.org/drawingml/2006/main" xmlns="" val="575474191"/>
       </p:ext>
     </p:extLst>
   </p:cSld>
@@ -6250,8 +7453,8 @@
 </p:sld>
 </file>
 
-<file path=ppt/slides/slide6.xml><?xml version="1.0" encoding="utf-8"?>
-<p:sld xmlns:a="http://schemas.openxmlformats.org/drawingml/2006/main" xmlns:r="http://schemas.openxmlformats.org/officeDocument/2006/relationships" xmlns:p="http://schemas.openxmlformats.org/presentationml/2006/main">
+<file path=ppt/slides/slide5.xml><?xml version="1.0" encoding="utf-8"?>
+<p:sld xmlns:a="http://schemas.openxmlformats.org/drawingml/2006/main" xmlns:r="http://schemas.openxmlformats.org/officeDocument/2006/relationships" xmlns:mc="http://schemas.openxmlformats.org/markup-compatibility/2006" xmlns:mv="urn:schemas-microsoft-com:mac:vml" xmlns:p="http://schemas.openxmlformats.org/presentationml/2006/main" mc:Ignorable="mv" mc:PreserveAttributes="mv:*">
   <p:cSld>
     <p:spTree>
       <p:nvGrpSpPr>
@@ -6289,7 +7492,7 @@
           <a:p>
             <a:r>
               <a:rPr lang="en-US" dirty="0" smtClean="0"/>
-              <a:t>&lt;source&gt;:</a:t>
+              <a:t>&lt;coverage&gt;:</a:t>
             </a:r>
           </a:p>
           <a:p>
@@ -6305,7 +7508,72 @@
     </p:spTree>
     <p:extLst>
       <p:ext uri="{BB962C8B-B14F-4D97-AF65-F5344CB8AC3E}">
-        <p14:creationId xmlns:p14="http://schemas.microsoft.com/office/powerpoint/2010/main" val="4050951280"/>
+        <p14:creationId xmlns:p14="http://schemas.microsoft.com/office/powerpoint/2010/main" xmlns:p="http://schemas.openxmlformats.org/presentationml/2006/main" xmlns:r="http://schemas.openxmlformats.org/officeDocument/2006/relationships" xmlns:a="http://schemas.openxmlformats.org/drawingml/2006/main" xmlns="" val="4050951280"/>
+      </p:ext>
+    </p:extLst>
+  </p:cSld>
+  <p:clrMapOvr>
+    <a:masterClrMapping/>
+  </p:clrMapOvr>
+</p:sld>
+</file>
+
+<file path=ppt/slides/slide6.xml><?xml version="1.0" encoding="utf-8"?>
+<p:sld xmlns:a="http://schemas.openxmlformats.org/drawingml/2006/main" xmlns:r="http://schemas.openxmlformats.org/officeDocument/2006/relationships" xmlns:mc="http://schemas.openxmlformats.org/markup-compatibility/2006" xmlns:mv="urn:schemas-microsoft-com:mac:vml" xmlns:p="http://schemas.openxmlformats.org/presentationml/2006/main" mc:Ignorable="mv" mc:PreserveAttributes="mv:*">
+  <p:cSld>
+    <p:spTree>
+      <p:nvGrpSpPr>
+        <p:cNvPr id="1" name=""/>
+        <p:cNvGrpSpPr/>
+        <p:nvPr/>
+      </p:nvGrpSpPr>
+      <p:grpSpPr>
+        <a:xfrm>
+          <a:off x="0" y="0"/>
+          <a:ext cx="0" cy="0"/>
+          <a:chOff x="0" y="0"/>
+          <a:chExt cx="0" cy="0"/>
+        </a:xfrm>
+      </p:grpSpPr>
+      <p:sp>
+        <p:nvSpPr>
+          <p:cNvPr id="3" name="Content Placeholder 2"/>
+          <p:cNvSpPr>
+            <a:spLocks noGrp="1"/>
+          </p:cNvSpPr>
+          <p:nvPr>
+            <p:ph idx="1"/>
+          </p:nvPr>
+        </p:nvSpPr>
+        <p:spPr>
+          <a:xfrm>
+            <a:off x="457200" y="457200"/>
+            <a:ext cx="8229600" cy="5668963"/>
+          </a:xfrm>
+        </p:spPr>
+        <p:txBody>
+          <a:bodyPr/>
+          <a:lstStyle/>
+          <a:p>
+            <a:r>
+              <a:rPr lang="en-US" dirty="0" smtClean="0"/>
+              <a:t>&lt;source&gt;:</a:t>
+            </a:r>
+          </a:p>
+          <a:p>
+            <a:pPr lvl="1"/>
+            <a:r>
+              <a:rPr lang="en-US" dirty="0" smtClean="0"/>
+              <a:t>What does this field mean?</a:t>
+            </a:r>
+            <a:endParaRPr lang="en-US" dirty="0"/>
+          </a:p>
+        </p:txBody>
+      </p:sp>
+    </p:spTree>
+    <p:extLst>
+      <p:ext uri="{BB962C8B-B14F-4D97-AF65-F5344CB8AC3E}">
+        <p14:creationId xmlns:p14="http://schemas.microsoft.com/office/powerpoint/2010/main" xmlns:p="http://schemas.openxmlformats.org/presentationml/2006/main" xmlns:r="http://schemas.openxmlformats.org/officeDocument/2006/relationships" xmlns:a="http://schemas.openxmlformats.org/drawingml/2006/main" xmlns="" val="4050951280"/>
       </p:ext>
     </p:extLst>
   </p:cSld>
@@ -6316,7 +7584,7 @@
 </file>
 
 <file path=ppt/slides/slide7.xml><?xml version="1.0" encoding="utf-8"?>
-<p:sld xmlns:a="http://schemas.openxmlformats.org/drawingml/2006/main" xmlns:r="http://schemas.openxmlformats.org/officeDocument/2006/relationships" xmlns:p="http://schemas.openxmlformats.org/presentationml/2006/main">
+<p:sld xmlns:a="http://schemas.openxmlformats.org/drawingml/2006/main" xmlns:r="http://schemas.openxmlformats.org/officeDocument/2006/relationships" xmlns:mc="http://schemas.openxmlformats.org/markup-compatibility/2006" xmlns:mv="urn:schemas-microsoft-com:mac:vml" xmlns:p="http://schemas.openxmlformats.org/presentationml/2006/main" mc:Ignorable="mv" mc:PreserveAttributes="mv:*">
   <p:cSld>
     <p:spTree>
       <p:nvGrpSpPr>
@@ -6343,10 +7611,10 @@
           </p:nvPr>
         </p:nvPicPr>
         <p:blipFill>
-          <a:blip r:embed="rId2">
+          <a:blip r:embed="rId3">
             <a:extLst>
               <a:ext uri="{28A0092B-C50C-407E-A947-70E740481C1C}">
-                <a14:useLocalDpi xmlns:a14="http://schemas.microsoft.com/office/drawing/2010/main" val="0"/>
+                <a14:useLocalDpi xmlns:a14="http://schemas.microsoft.com/office/drawing/2010/main" xmlns:p="http://schemas.openxmlformats.org/presentationml/2006/main" xmlns:r="http://schemas.openxmlformats.org/officeDocument/2006/relationships" xmlns:a="http://schemas.openxmlformats.org/drawingml/2006/main" xmlns="" val="0"/>
               </a:ext>
             </a:extLst>
           </a:blip>
@@ -6397,7 +7665,7 @@
             </a:r>
             <a:r>
               <a:rPr lang="en-US" dirty="0" smtClean="0">
-                <a:hlinkClick r:id="rId3"/>
+                <a:hlinkClick r:id="rId4"/>
               </a:rPr>
               <a:t>http://dx.doi.org/10.1108/10650750410527322</a:t>
             </a:r>
@@ -6408,7 +7676,7 @@
     </p:spTree>
     <p:extLst>
       <p:ext uri="{BB962C8B-B14F-4D97-AF65-F5344CB8AC3E}">
-        <p14:creationId xmlns:p14="http://schemas.microsoft.com/office/powerpoint/2010/main" val="380760446"/>
+        <p14:creationId xmlns:p14="http://schemas.microsoft.com/office/powerpoint/2010/main" xmlns:p="http://schemas.openxmlformats.org/presentationml/2006/main" xmlns:r="http://schemas.openxmlformats.org/officeDocument/2006/relationships" xmlns:a="http://schemas.openxmlformats.org/drawingml/2006/main" xmlns="" val="380760446"/>
       </p:ext>
     </p:extLst>
   </p:cSld>
@@ -6419,7 +7687,7 @@
 </file>
 
 <file path=ppt/slides/slide8.xml><?xml version="1.0" encoding="utf-8"?>
-<p:sld xmlns:a="http://schemas.openxmlformats.org/drawingml/2006/main" xmlns:r="http://schemas.openxmlformats.org/officeDocument/2006/relationships" xmlns:p="http://schemas.openxmlformats.org/presentationml/2006/main">
+<p:sld xmlns:a="http://schemas.openxmlformats.org/drawingml/2006/main" xmlns:r="http://schemas.openxmlformats.org/officeDocument/2006/relationships" xmlns:mc="http://schemas.openxmlformats.org/markup-compatibility/2006" xmlns:mv="urn:schemas-microsoft-com:mac:vml" xmlns:p="http://schemas.openxmlformats.org/presentationml/2006/main" mc:Ignorable="mv" mc:PreserveAttributes="mv:*">
   <p:cSld>
     <p:spTree>
       <p:nvGrpSpPr>
@@ -6446,10 +7714,10 @@
           </p:nvPr>
         </p:nvPicPr>
         <p:blipFill>
-          <a:blip r:embed="rId2">
+          <a:blip r:embed="rId3">
             <a:extLst>
               <a:ext uri="{28A0092B-C50C-407E-A947-70E740481C1C}">
-                <a14:useLocalDpi xmlns:a14="http://schemas.microsoft.com/office/drawing/2010/main" val="0"/>
+                <a14:useLocalDpi xmlns:a14="http://schemas.microsoft.com/office/drawing/2010/main" xmlns:p="http://schemas.openxmlformats.org/presentationml/2006/main" xmlns:r="http://schemas.openxmlformats.org/officeDocument/2006/relationships" xmlns:a="http://schemas.openxmlformats.org/drawingml/2006/main" xmlns="" val="0"/>
               </a:ext>
             </a:extLst>
           </a:blip>
@@ -6500,7 +7768,7 @@
             </a:r>
             <a:r>
               <a:rPr lang="en-US" dirty="0" smtClean="0">
-                <a:hlinkClick r:id="rId3"/>
+                <a:hlinkClick r:id="rId4"/>
               </a:rPr>
               <a:t>http://dx.doi.org/10.1177/0165551509337871</a:t>
             </a:r>
@@ -6515,7 +7783,7 @@
     </p:spTree>
     <p:extLst>
       <p:ext uri="{BB962C8B-B14F-4D97-AF65-F5344CB8AC3E}">
-        <p14:creationId xmlns:p14="http://schemas.microsoft.com/office/powerpoint/2010/main" val="3137489002"/>
+        <p14:creationId xmlns:p14="http://schemas.microsoft.com/office/powerpoint/2010/main" xmlns:p="http://schemas.openxmlformats.org/presentationml/2006/main" xmlns:r="http://schemas.openxmlformats.org/officeDocument/2006/relationships" xmlns:a="http://schemas.openxmlformats.org/drawingml/2006/main" xmlns="" val="3137489002"/>
       </p:ext>
     </p:extLst>
   </p:cSld>
@@ -6526,7 +7794,7 @@
 </file>
 
 <file path=ppt/slides/slide9.xml><?xml version="1.0" encoding="utf-8"?>
-<p:sld xmlns:a="http://schemas.openxmlformats.org/drawingml/2006/main" xmlns:r="http://schemas.openxmlformats.org/officeDocument/2006/relationships" xmlns:p="http://schemas.openxmlformats.org/presentationml/2006/main">
+<p:sld xmlns:a="http://schemas.openxmlformats.org/drawingml/2006/main" xmlns:r="http://schemas.openxmlformats.org/officeDocument/2006/relationships" xmlns:mc="http://schemas.openxmlformats.org/markup-compatibility/2006" xmlns:mv="urn:schemas-microsoft-com:mac:vml" xmlns:p="http://schemas.openxmlformats.org/presentationml/2006/main" mc:Ignorable="mv" mc:PreserveAttributes="mv:*">
   <p:cSld>
     <p:spTree>
       <p:nvGrpSpPr>
@@ -6613,7 +7881,7 @@
     </p:spTree>
     <p:extLst>
       <p:ext uri="{BB962C8B-B14F-4D97-AF65-F5344CB8AC3E}">
-        <p14:creationId xmlns:p14="http://schemas.microsoft.com/office/powerpoint/2010/main" val="636181493"/>
+        <p14:creationId xmlns:p14="http://schemas.microsoft.com/office/powerpoint/2010/main" xmlns:p="http://schemas.openxmlformats.org/presentationml/2006/main" xmlns:r="http://schemas.openxmlformats.org/officeDocument/2006/relationships" xmlns:a="http://schemas.openxmlformats.org/drawingml/2006/main" xmlns="" val="636181493"/>
       </p:ext>
     </p:extLst>
   </p:cSld>

</xml_diff>